<commit_message>
learning git powerpoint added.
</commit_message>
<xml_diff>
--- a/learn_git/Learning_git.pptx
+++ b/learn_git/Learning_git.pptx
@@ -5,13 +5,18 @@
     <p:sldMasterId id="2147483648" r:id="rId4"/>
   </p:sldMasterIdLst>
   <p:notesMasterIdLst>
-    <p:notesMasterId r:id="rId9"/>
+    <p:notesMasterId r:id="rId14"/>
   </p:notesMasterIdLst>
   <p:sldIdLst>
     <p:sldId id="277" r:id="rId5"/>
     <p:sldId id="280" r:id="rId6"/>
-    <p:sldId id="293" r:id="rId7"/>
-    <p:sldId id="292" r:id="rId8"/>
+    <p:sldId id="295" r:id="rId7"/>
+    <p:sldId id="296" r:id="rId8"/>
+    <p:sldId id="297" r:id="rId9"/>
+    <p:sldId id="293" r:id="rId10"/>
+    <p:sldId id="292" r:id="rId11"/>
+    <p:sldId id="299" r:id="rId12"/>
+    <p:sldId id="298" r:id="rId13"/>
   </p:sldIdLst>
   <p:sldSz cx="12192000" cy="6858000"/>
   <p:notesSz cx="6858000" cy="9144000"/>
@@ -200,7 +205,7 @@
           <a:p>
             <a:fld id="{181EC09C-9CDC-48F0-BB82-ED223F986966}" type="datetimeFigureOut">
               <a:rPr lang="en-US" smtClean="0"/>
-              <a:t>6/27/2022</a:t>
+              <a:t>7/4/2022</a:t>
             </a:fld>
             <a:endParaRPr lang="en-US" dirty="0"/>
           </a:p>
@@ -694,7 +699,7 @@
           <a:p>
             <a:fld id="{9D874152-028B-486A-9CCC-467A5536A7DC}" type="datetime1">
               <a:rPr lang="en-US" smtClean="0"/>
-              <a:t>6/27/2022</a:t>
+              <a:t>7/4/2022</a:t>
             </a:fld>
             <a:endParaRPr lang="en-US" dirty="0"/>
           </a:p>
@@ -1023,7 +1028,7 @@
           <a:p>
             <a:fld id="{8A1558FF-9F53-4DAD-84A1-1EEE4F190FF1}" type="datetime1">
               <a:rPr lang="en-US" smtClean="0"/>
-              <a:t>6/27/2022</a:t>
+              <a:t>7/4/2022</a:t>
             </a:fld>
             <a:endParaRPr lang="en-US" dirty="0"/>
           </a:p>
@@ -1296,7 +1301,7 @@
           <a:p>
             <a:fld id="{A78FA1A6-D89D-4E0B-ACDC-F92429034F56}" type="datetime1">
               <a:rPr lang="en-US" smtClean="0"/>
-              <a:t>6/27/2022</a:t>
+              <a:t>7/4/2022</a:t>
             </a:fld>
             <a:endParaRPr lang="en-US" dirty="0"/>
           </a:p>
@@ -1859,7 +1864,7 @@
           <a:p>
             <a:fld id="{8BA382F0-6EA8-4D82-951F-1579D6A93CC4}" type="datetime1">
               <a:rPr lang="en-US" smtClean="0"/>
-              <a:t>6/27/2022</a:t>
+              <a:t>7/4/2022</a:t>
             </a:fld>
             <a:endParaRPr lang="en-US" dirty="0"/>
           </a:p>
@@ -2132,7 +2137,7 @@
           <a:p>
             <a:fld id="{CDBE913C-F349-4CE3-A910-0EA13427FE0D}" type="datetime1">
               <a:rPr lang="en-US" smtClean="0"/>
-              <a:t>6/27/2022</a:t>
+              <a:t>7/4/2022</a:t>
             </a:fld>
             <a:endParaRPr lang="en-US" dirty="0"/>
           </a:p>
@@ -2689,7 +2694,7 @@
           <a:p>
             <a:fld id="{70D4C5C7-4D27-4EBE-9DB8-92F5F0F40B34}" type="datetime1">
               <a:rPr lang="en-US" smtClean="0"/>
-              <a:t>6/27/2022</a:t>
+              <a:t>7/4/2022</a:t>
             </a:fld>
             <a:endParaRPr lang="en-US" dirty="0"/>
           </a:p>
@@ -3011,7 +3016,7 @@
           <a:p>
             <a:fld id="{B6CDAF82-EDB2-4FBF-83F4-247A1B3455CB}" type="datetime1">
               <a:rPr lang="en-US" smtClean="0"/>
-              <a:t>6/27/2022</a:t>
+              <a:t>7/4/2022</a:t>
             </a:fld>
             <a:endParaRPr lang="en-US" dirty="0"/>
           </a:p>
@@ -3183,7 +3188,7 @@
           <a:p>
             <a:fld id="{2D5E59DB-4C5A-44A3-897C-FF6803F94296}" type="datetime1">
               <a:rPr lang="en-US" smtClean="0"/>
-              <a:t>6/27/2022</a:t>
+              <a:t>7/4/2022</a:t>
             </a:fld>
             <a:endParaRPr lang="en-US" dirty="0"/>
           </a:p>
@@ -3414,7 +3419,7 @@
           <a:p>
             <a:fld id="{E9F6B6E0-E0F8-4800-BD74-7D33DFE5ED7E}" type="datetime1">
               <a:rPr lang="en-US" smtClean="0"/>
-              <a:t>6/27/2022</a:t>
+              <a:t>7/4/2022</a:t>
             </a:fld>
             <a:endParaRPr lang="en-US" dirty="0"/>
           </a:p>
@@ -3608,7 +3613,7 @@
           <a:p>
             <a:fld id="{6E6DC824-D0E7-4046-8B44-4AAD1C4DE2CF}" type="datetime1">
               <a:rPr lang="en-US" smtClean="0"/>
-              <a:t>6/27/2022</a:t>
+              <a:t>7/4/2022</a:t>
             </a:fld>
             <a:endParaRPr lang="en-US" dirty="0"/>
           </a:p>
@@ -3879,7 +3884,7 @@
           <a:p>
             <a:fld id="{FEFC221C-17A4-4F42-9F54-9F7E03AA1BBB}" type="datetime1">
               <a:rPr lang="en-US" smtClean="0"/>
-              <a:t>6/27/2022</a:t>
+              <a:t>7/4/2022</a:t>
             </a:fld>
             <a:endParaRPr lang="en-US" dirty="0"/>
           </a:p>
@@ -4138,7 +4143,7 @@
           <a:p>
             <a:fld id="{38CD7CBA-5256-42F3-BAB5-33F095514AE3}" type="datetime1">
               <a:rPr lang="en-US" smtClean="0"/>
-              <a:t>6/27/2022</a:t>
+              <a:t>7/4/2022</a:t>
             </a:fld>
             <a:endParaRPr lang="en-US" dirty="0"/>
           </a:p>
@@ -4505,7 +4510,7 @@
           <a:p>
             <a:fld id="{8EB80C04-2E33-403B-B014-7E203A57326C}" type="datetime1">
               <a:rPr lang="en-US" smtClean="0"/>
-              <a:t>6/27/2022</a:t>
+              <a:t>7/4/2022</a:t>
             </a:fld>
             <a:endParaRPr lang="en-US" dirty="0"/>
           </a:p>
@@ -4648,7 +4653,7 @@
           <a:p>
             <a:fld id="{8C92A49D-7D7F-4D69-A8AA-65D6B58C15F2}" type="datetime1">
               <a:rPr lang="en-US" smtClean="0"/>
-              <a:t>6/27/2022</a:t>
+              <a:t>7/4/2022</a:t>
             </a:fld>
             <a:endParaRPr lang="en-US" dirty="0"/>
           </a:p>
@@ -4769,7 +4774,7 @@
           <a:p>
             <a:fld id="{09E02903-36C1-4F6B-9F27-EA2305255204}" type="datetime1">
               <a:rPr lang="en-US" smtClean="0"/>
-              <a:t>6/27/2022</a:t>
+              <a:t>7/4/2022</a:t>
             </a:fld>
             <a:endParaRPr lang="en-US" dirty="0"/>
           </a:p>
@@ -5048,7 +5053,7 @@
           <a:p>
             <a:fld id="{2E8BBFA8-C775-4121-A7F6-6851C8035873}" type="datetime1">
               <a:rPr lang="en-US" smtClean="0"/>
-              <a:t>6/27/2022</a:t>
+              <a:t>7/4/2022</a:t>
             </a:fld>
             <a:endParaRPr lang="en-US" dirty="0"/>
           </a:p>
@@ -5367,7 +5372,7 @@
           <a:p>
             <a:fld id="{6EC01760-8EEC-4A4C-BD0D-3CDAAA80A266}" type="datetime1">
               <a:rPr lang="en-US" smtClean="0"/>
-              <a:t>6/27/2022</a:t>
+              <a:t>7/4/2022</a:t>
             </a:fld>
             <a:endParaRPr lang="en-US" dirty="0"/>
           </a:p>
@@ -5575,7 +5580,7 @@
           <a:p>
             <a:fld id="{B183DE74-4CAD-4852-95E7-A055FD779420}" type="datetime1">
               <a:rPr lang="en-US" smtClean="0"/>
-              <a:t>6/27/2022</a:t>
+              <a:t>7/4/2022</a:t>
             </a:fld>
             <a:endParaRPr lang="en-US" dirty="0"/>
           </a:p>
@@ -6550,17 +6555,17 @@
                 </a:effectLst>
                 <a:latin typeface="Poor Richard" panose="02080502050505020702" pitchFamily="18" charset="0"/>
               </a:rPr>
-              <a:t>Search bar Github.com</a:t>
-            </a:r>
-          </a:p>
-        </p:txBody>
-      </p:sp>
-      <p:sp>
-        <p:nvSpPr>
-          <p:cNvPr id="3" name="Rectangle: Rounded Corners 2">
+              <a:t>Git Big Picture (Local)</a:t>
+            </a:r>
+          </a:p>
+        </p:txBody>
+      </p:sp>
+      <p:sp>
+        <p:nvSpPr>
+          <p:cNvPr id="5" name="Oval 4">
             <a:extLst>
               <a:ext uri="{FF2B5EF4-FFF2-40B4-BE49-F238E27FC236}">
-                <a16:creationId xmlns:a16="http://schemas.microsoft.com/office/drawing/2014/main" id="{EA2FC01D-16C5-48D7-8B7C-B82949EA46C4}"/>
+                <a16:creationId xmlns:a16="http://schemas.microsoft.com/office/drawing/2014/main" id="{65EE2C99-E1DA-922D-47E4-D6D0308A014A}"/>
               </a:ext>
             </a:extLst>
           </p:cNvPr>
@@ -6569,17 +6574,1552 @@
         </p:nvSpPr>
         <p:spPr>
           <a:xfrm>
-            <a:off x="0" y="1033669"/>
-            <a:ext cx="12192000" cy="5824332"/>
-          </a:xfrm>
-          <a:prstGeom prst="roundRect">
-            <a:avLst>
-              <a:gd name="adj" fmla="val 15461"/>
-            </a:avLst>
+            <a:off x="2370615" y="1797363"/>
+            <a:ext cx="672860" cy="672860"/>
+          </a:xfrm>
+          <a:prstGeom prst="ellipse">
+            <a:avLst/>
+          </a:prstGeom>
+        </p:spPr>
+        <p:style>
+          <a:lnRef idx="2">
+            <a:schemeClr val="accent1">
+              <a:shade val="50000"/>
+            </a:schemeClr>
+          </a:lnRef>
+          <a:fillRef idx="1">
+            <a:schemeClr val="accent1"/>
+          </a:fillRef>
+          <a:effectRef idx="0">
+            <a:schemeClr val="accent1"/>
+          </a:effectRef>
+          <a:fontRef idx="minor">
+            <a:schemeClr val="lt1"/>
+          </a:fontRef>
+        </p:style>
+        <p:txBody>
+          <a:bodyPr rtlCol="0" anchor="ctr"/>
+          <a:lstStyle/>
+          <a:p>
+            <a:pPr algn="ctr"/>
+            <a:endParaRPr lang="en-US"/>
+          </a:p>
+        </p:txBody>
+      </p:sp>
+      <p:sp>
+        <p:nvSpPr>
+          <p:cNvPr id="6" name="Oval 5">
+            <a:extLst>
+              <a:ext uri="{FF2B5EF4-FFF2-40B4-BE49-F238E27FC236}">
+                <a16:creationId xmlns:a16="http://schemas.microsoft.com/office/drawing/2014/main" id="{C20A131F-488F-E5E9-DEE7-F129855E63EB}"/>
+              </a:ext>
+            </a:extLst>
+          </p:cNvPr>
+          <p:cNvSpPr/>
+          <p:nvPr/>
+        </p:nvSpPr>
+        <p:spPr>
+          <a:xfrm>
+            <a:off x="7586721" y="1797363"/>
+            <a:ext cx="672860" cy="672860"/>
+          </a:xfrm>
+          <a:prstGeom prst="ellipse">
+            <a:avLst/>
+          </a:prstGeom>
+        </p:spPr>
+        <p:style>
+          <a:lnRef idx="2">
+            <a:schemeClr val="accent1">
+              <a:shade val="50000"/>
+            </a:schemeClr>
+          </a:lnRef>
+          <a:fillRef idx="1">
+            <a:schemeClr val="accent1"/>
+          </a:fillRef>
+          <a:effectRef idx="0">
+            <a:schemeClr val="accent1"/>
+          </a:effectRef>
+          <a:fontRef idx="minor">
+            <a:schemeClr val="lt1"/>
+          </a:fontRef>
+        </p:style>
+        <p:txBody>
+          <a:bodyPr rtlCol="0" anchor="ctr"/>
+          <a:lstStyle/>
+          <a:p>
+            <a:pPr algn="ctr"/>
+            <a:endParaRPr lang="en-US"/>
+          </a:p>
+        </p:txBody>
+      </p:sp>
+      <p:sp>
+        <p:nvSpPr>
+          <p:cNvPr id="7" name="Oval 6">
+            <a:extLst>
+              <a:ext uri="{FF2B5EF4-FFF2-40B4-BE49-F238E27FC236}">
+                <a16:creationId xmlns:a16="http://schemas.microsoft.com/office/drawing/2014/main" id="{A46FFAF6-E63D-5DBC-C834-DB8FCA1333F0}"/>
+              </a:ext>
+            </a:extLst>
+          </p:cNvPr>
+          <p:cNvSpPr/>
+          <p:nvPr/>
+        </p:nvSpPr>
+        <p:spPr>
+          <a:xfrm>
+            <a:off x="4109317" y="1797363"/>
+            <a:ext cx="672860" cy="672860"/>
+          </a:xfrm>
+          <a:prstGeom prst="ellipse">
+            <a:avLst/>
+          </a:prstGeom>
+        </p:spPr>
+        <p:style>
+          <a:lnRef idx="2">
+            <a:schemeClr val="accent1">
+              <a:shade val="50000"/>
+            </a:schemeClr>
+          </a:lnRef>
+          <a:fillRef idx="1">
+            <a:schemeClr val="accent1"/>
+          </a:fillRef>
+          <a:effectRef idx="0">
+            <a:schemeClr val="accent1"/>
+          </a:effectRef>
+          <a:fontRef idx="minor">
+            <a:schemeClr val="lt1"/>
+          </a:fontRef>
+        </p:style>
+        <p:txBody>
+          <a:bodyPr rtlCol="0" anchor="ctr"/>
+          <a:lstStyle/>
+          <a:p>
+            <a:pPr algn="ctr"/>
+            <a:endParaRPr lang="en-US"/>
+          </a:p>
+        </p:txBody>
+      </p:sp>
+      <p:sp>
+        <p:nvSpPr>
+          <p:cNvPr id="8" name="Oval 7">
+            <a:extLst>
+              <a:ext uri="{FF2B5EF4-FFF2-40B4-BE49-F238E27FC236}">
+                <a16:creationId xmlns:a16="http://schemas.microsoft.com/office/drawing/2014/main" id="{919DDDDC-C219-DC30-50D3-397833EC92B8}"/>
+              </a:ext>
+            </a:extLst>
+          </p:cNvPr>
+          <p:cNvSpPr/>
+          <p:nvPr/>
+        </p:nvSpPr>
+        <p:spPr>
+          <a:xfrm>
+            <a:off x="5848019" y="1797363"/>
+            <a:ext cx="672860" cy="672860"/>
+          </a:xfrm>
+          <a:prstGeom prst="ellipse">
+            <a:avLst/>
+          </a:prstGeom>
+        </p:spPr>
+        <p:style>
+          <a:lnRef idx="2">
+            <a:schemeClr val="accent1">
+              <a:shade val="50000"/>
+            </a:schemeClr>
+          </a:lnRef>
+          <a:fillRef idx="1">
+            <a:schemeClr val="accent1"/>
+          </a:fillRef>
+          <a:effectRef idx="0">
+            <a:schemeClr val="accent1"/>
+          </a:effectRef>
+          <a:fontRef idx="minor">
+            <a:schemeClr val="lt1"/>
+          </a:fontRef>
+        </p:style>
+        <p:txBody>
+          <a:bodyPr rtlCol="0" anchor="ctr"/>
+          <a:lstStyle/>
+          <a:p>
+            <a:pPr algn="ctr"/>
+            <a:endParaRPr lang="en-US"/>
+          </a:p>
+        </p:txBody>
+      </p:sp>
+      <p:cxnSp>
+        <p:nvCxnSpPr>
+          <p:cNvPr id="10" name="Straight Arrow Connector 9">
+            <a:extLst>
+              <a:ext uri="{FF2B5EF4-FFF2-40B4-BE49-F238E27FC236}">
+                <a16:creationId xmlns:a16="http://schemas.microsoft.com/office/drawing/2014/main" id="{B5FA0263-C9F6-53C5-3F44-91409F51019E}"/>
+              </a:ext>
+            </a:extLst>
+          </p:cNvPr>
+          <p:cNvCxnSpPr>
+            <a:stCxn id="5" idx="6"/>
+            <a:endCxn id="7" idx="2"/>
+          </p:cNvCxnSpPr>
+          <p:nvPr/>
+        </p:nvCxnSpPr>
+        <p:spPr>
+          <a:xfrm>
+            <a:off x="3043475" y="2133793"/>
+            <a:ext cx="1065842" cy="0"/>
+          </a:xfrm>
+          <a:prstGeom prst="straightConnector1">
+            <a:avLst/>
+          </a:prstGeom>
+          <a:ln>
+            <a:solidFill>
+              <a:schemeClr val="tx1"/>
+            </a:solidFill>
+            <a:tailEnd type="triangle"/>
+          </a:ln>
+        </p:spPr>
+        <p:style>
+          <a:lnRef idx="3">
+            <a:schemeClr val="accent1"/>
+          </a:lnRef>
+          <a:fillRef idx="0">
+            <a:schemeClr val="accent1"/>
+          </a:fillRef>
+          <a:effectRef idx="2">
+            <a:schemeClr val="accent1"/>
+          </a:effectRef>
+          <a:fontRef idx="minor">
+            <a:schemeClr val="tx1"/>
+          </a:fontRef>
+        </p:style>
+      </p:cxnSp>
+      <p:cxnSp>
+        <p:nvCxnSpPr>
+          <p:cNvPr id="11" name="Straight Arrow Connector 10">
+            <a:extLst>
+              <a:ext uri="{FF2B5EF4-FFF2-40B4-BE49-F238E27FC236}">
+                <a16:creationId xmlns:a16="http://schemas.microsoft.com/office/drawing/2014/main" id="{B31B2D7F-4236-E1D8-03EB-E996DFC0C4D4}"/>
+              </a:ext>
+            </a:extLst>
+          </p:cNvPr>
+          <p:cNvCxnSpPr>
+            <a:cxnSpLocks/>
+            <a:stCxn id="7" idx="6"/>
+            <a:endCxn id="8" idx="2"/>
+          </p:cNvCxnSpPr>
+          <p:nvPr/>
+        </p:nvCxnSpPr>
+        <p:spPr>
+          <a:xfrm>
+            <a:off x="4782177" y="2133793"/>
+            <a:ext cx="1065842" cy="0"/>
+          </a:xfrm>
+          <a:prstGeom prst="straightConnector1">
+            <a:avLst/>
+          </a:prstGeom>
+          <a:ln>
+            <a:solidFill>
+              <a:schemeClr val="tx1"/>
+            </a:solidFill>
+            <a:tailEnd type="triangle"/>
+          </a:ln>
+        </p:spPr>
+        <p:style>
+          <a:lnRef idx="3">
+            <a:schemeClr val="accent1"/>
+          </a:lnRef>
+          <a:fillRef idx="0">
+            <a:schemeClr val="accent1"/>
+          </a:fillRef>
+          <a:effectRef idx="2">
+            <a:schemeClr val="accent1"/>
+          </a:effectRef>
+          <a:fontRef idx="minor">
+            <a:schemeClr val="tx1"/>
+          </a:fontRef>
+        </p:style>
+      </p:cxnSp>
+      <p:cxnSp>
+        <p:nvCxnSpPr>
+          <p:cNvPr id="14" name="Straight Arrow Connector 13">
+            <a:extLst>
+              <a:ext uri="{FF2B5EF4-FFF2-40B4-BE49-F238E27FC236}">
+                <a16:creationId xmlns:a16="http://schemas.microsoft.com/office/drawing/2014/main" id="{FEA4D73A-77BC-4B8A-F717-3AECEEABE5BD}"/>
+              </a:ext>
+            </a:extLst>
+          </p:cNvPr>
+          <p:cNvCxnSpPr>
+            <a:cxnSpLocks/>
+            <a:stCxn id="8" idx="6"/>
+            <a:endCxn id="6" idx="2"/>
+          </p:cNvCxnSpPr>
+          <p:nvPr/>
+        </p:nvCxnSpPr>
+        <p:spPr>
+          <a:xfrm>
+            <a:off x="6520879" y="2133793"/>
+            <a:ext cx="1065842" cy="0"/>
+          </a:xfrm>
+          <a:prstGeom prst="straightConnector1">
+            <a:avLst/>
+          </a:prstGeom>
+          <a:ln>
+            <a:solidFill>
+              <a:schemeClr val="tx1"/>
+            </a:solidFill>
+            <a:tailEnd type="triangle"/>
+          </a:ln>
+        </p:spPr>
+        <p:style>
+          <a:lnRef idx="3">
+            <a:schemeClr val="accent1"/>
+          </a:lnRef>
+          <a:fillRef idx="0">
+            <a:schemeClr val="accent1"/>
+          </a:fillRef>
+          <a:effectRef idx="2">
+            <a:schemeClr val="accent1"/>
+          </a:effectRef>
+          <a:fontRef idx="minor">
+            <a:schemeClr val="tx1"/>
+          </a:fontRef>
+        </p:style>
+      </p:cxnSp>
+      <p:cxnSp>
+        <p:nvCxnSpPr>
+          <p:cNvPr id="18" name="Connector: Curved 17">
+            <a:extLst>
+              <a:ext uri="{FF2B5EF4-FFF2-40B4-BE49-F238E27FC236}">
+                <a16:creationId xmlns:a16="http://schemas.microsoft.com/office/drawing/2014/main" id="{79994848-F5A0-643F-D855-0DB8A6313893}"/>
+              </a:ext>
+            </a:extLst>
+          </p:cNvPr>
+          <p:cNvCxnSpPr>
+            <a:cxnSpLocks/>
+            <a:stCxn id="19" idx="2"/>
+            <a:endCxn id="5" idx="2"/>
+          </p:cNvCxnSpPr>
+          <p:nvPr/>
+        </p:nvCxnSpPr>
+        <p:spPr>
+          <a:xfrm rot="16200000" flipH="1">
+            <a:off x="1519164" y="1282341"/>
+            <a:ext cx="579219" cy="1123684"/>
+          </a:xfrm>
+          <a:prstGeom prst="curvedConnector2">
+            <a:avLst/>
+          </a:prstGeom>
+          <a:ln>
+            <a:solidFill>
+              <a:schemeClr val="tx1"/>
+            </a:solidFill>
+            <a:tailEnd type="triangle"/>
+          </a:ln>
+        </p:spPr>
+        <p:style>
+          <a:lnRef idx="1">
+            <a:schemeClr val="accent1"/>
+          </a:lnRef>
+          <a:fillRef idx="0">
+            <a:schemeClr val="accent1"/>
+          </a:fillRef>
+          <a:effectRef idx="0">
+            <a:schemeClr val="accent1"/>
+          </a:effectRef>
+          <a:fontRef idx="minor">
+            <a:schemeClr val="tx1"/>
+          </a:fontRef>
+        </p:style>
+      </p:cxnSp>
+      <p:sp>
+        <p:nvSpPr>
+          <p:cNvPr id="19" name="TextBox 18">
+            <a:extLst>
+              <a:ext uri="{FF2B5EF4-FFF2-40B4-BE49-F238E27FC236}">
+                <a16:creationId xmlns:a16="http://schemas.microsoft.com/office/drawing/2014/main" id="{9B6BDFA8-6DAB-0073-C30C-96DF6106A50E}"/>
+              </a:ext>
+            </a:extLst>
+          </p:cNvPr>
+          <p:cNvSpPr txBox="1"/>
+          <p:nvPr/>
+        </p:nvSpPr>
+        <p:spPr>
+          <a:xfrm>
+            <a:off x="168528" y="1185242"/>
+            <a:ext cx="2156805" cy="369332"/>
+          </a:xfrm>
+          <a:prstGeom prst="rect">
+            <a:avLst/>
           </a:prstGeom>
           <a:noFill/>
+        </p:spPr>
+        <p:txBody>
+          <a:bodyPr wrap="square" rtlCol="0">
+            <a:spAutoFit/>
+          </a:bodyPr>
+          <a:lstStyle/>
+          <a:p>
+            <a:pPr algn="ctr"/>
+            <a:r>
+              <a:rPr lang="en-US" dirty="0">
+                <a:latin typeface="Segoe Print" panose="02000600000000000000" pitchFamily="2" charset="0"/>
+              </a:rPr>
+              <a:t>Starting Project</a:t>
+            </a:r>
+          </a:p>
+        </p:txBody>
+      </p:sp>
+      <p:sp>
+        <p:nvSpPr>
+          <p:cNvPr id="27" name="TextBox 26">
+            <a:extLst>
+              <a:ext uri="{FF2B5EF4-FFF2-40B4-BE49-F238E27FC236}">
+                <a16:creationId xmlns:a16="http://schemas.microsoft.com/office/drawing/2014/main" id="{6CE64756-5420-245A-4AA4-8B56911129D9}"/>
+              </a:ext>
+            </a:extLst>
+          </p:cNvPr>
+          <p:cNvSpPr txBox="1"/>
+          <p:nvPr/>
+        </p:nvSpPr>
+        <p:spPr>
+          <a:xfrm>
+            <a:off x="-1" y="1988312"/>
+            <a:ext cx="1880760" cy="307777"/>
+          </a:xfrm>
+          <a:prstGeom prst="rect">
+            <a:avLst/>
+          </a:prstGeom>
+          <a:noFill/>
+        </p:spPr>
+        <p:txBody>
+          <a:bodyPr wrap="square" rtlCol="0">
+            <a:spAutoFit/>
+          </a:bodyPr>
+          <a:lstStyle/>
+          <a:p>
+            <a:pPr algn="ctr"/>
+            <a:r>
+              <a:rPr lang="en-US" sz="1400" dirty="0">
+                <a:latin typeface="Segoe Print" panose="02000600000000000000" pitchFamily="2" charset="0"/>
+              </a:rPr>
+              <a:t>First Commit</a:t>
+            </a:r>
+          </a:p>
+        </p:txBody>
+      </p:sp>
+      <p:sp>
+        <p:nvSpPr>
+          <p:cNvPr id="13" name="TextBox 12">
+            <a:extLst>
+              <a:ext uri="{FF2B5EF4-FFF2-40B4-BE49-F238E27FC236}">
+                <a16:creationId xmlns:a16="http://schemas.microsoft.com/office/drawing/2014/main" id="{6FCCF68F-4A0A-0F49-DEBF-C69D71DF50D5}"/>
+              </a:ext>
+            </a:extLst>
+          </p:cNvPr>
+          <p:cNvSpPr txBox="1"/>
+          <p:nvPr/>
+        </p:nvSpPr>
+        <p:spPr>
+          <a:xfrm>
+            <a:off x="3015070" y="1860986"/>
+            <a:ext cx="1123685" cy="261610"/>
+          </a:xfrm>
+          <a:prstGeom prst="rect">
+            <a:avLst/>
+          </a:prstGeom>
+          <a:noFill/>
+        </p:spPr>
+        <p:txBody>
+          <a:bodyPr wrap="square" rtlCol="0">
+            <a:spAutoFit/>
+          </a:bodyPr>
+          <a:lstStyle/>
+          <a:p>
+            <a:pPr algn="ctr"/>
+            <a:r>
+              <a:rPr lang="en-US" sz="1100" dirty="0">
+                <a:latin typeface="Segoe Print" panose="02000600000000000000" pitchFamily="2" charset="0"/>
+              </a:rPr>
+              <a:t>New Commit</a:t>
+            </a:r>
+          </a:p>
+        </p:txBody>
+      </p:sp>
+      <p:cxnSp>
+        <p:nvCxnSpPr>
+          <p:cNvPr id="45" name="Straight Arrow Connector 44">
+            <a:extLst>
+              <a:ext uri="{FF2B5EF4-FFF2-40B4-BE49-F238E27FC236}">
+                <a16:creationId xmlns:a16="http://schemas.microsoft.com/office/drawing/2014/main" id="{9B35B150-86B8-D710-3F43-EBA15BE73509}"/>
+              </a:ext>
+            </a:extLst>
+          </p:cNvPr>
+          <p:cNvCxnSpPr>
+            <a:cxnSpLocks/>
+            <a:stCxn id="6" idx="6"/>
+            <a:endCxn id="72" idx="2"/>
+          </p:cNvCxnSpPr>
+          <p:nvPr/>
+        </p:nvCxnSpPr>
+        <p:spPr>
+          <a:xfrm>
+            <a:off x="8259581" y="2133793"/>
+            <a:ext cx="1065842" cy="0"/>
+          </a:xfrm>
+          <a:prstGeom prst="straightConnector1">
+            <a:avLst/>
+          </a:prstGeom>
           <a:ln>
-            <a:noFill/>
+            <a:solidFill>
+              <a:schemeClr val="tx1"/>
+            </a:solidFill>
+            <a:tailEnd type="triangle"/>
+          </a:ln>
+        </p:spPr>
+        <p:style>
+          <a:lnRef idx="3">
+            <a:schemeClr val="accent1"/>
+          </a:lnRef>
+          <a:fillRef idx="0">
+            <a:schemeClr val="accent1"/>
+          </a:fillRef>
+          <a:effectRef idx="2">
+            <a:schemeClr val="accent1"/>
+          </a:effectRef>
+          <a:fontRef idx="minor">
+            <a:schemeClr val="tx1"/>
+          </a:fontRef>
+        </p:style>
+      </p:cxnSp>
+      <p:cxnSp>
+        <p:nvCxnSpPr>
+          <p:cNvPr id="63" name="Straight Arrow Connector 62">
+            <a:extLst>
+              <a:ext uri="{FF2B5EF4-FFF2-40B4-BE49-F238E27FC236}">
+                <a16:creationId xmlns:a16="http://schemas.microsoft.com/office/drawing/2014/main" id="{66DD323D-1D0D-CE9D-E685-162DB310AEF6}"/>
+              </a:ext>
+            </a:extLst>
+          </p:cNvPr>
+          <p:cNvCxnSpPr>
+            <a:cxnSpLocks/>
+            <a:stCxn id="7" idx="5"/>
+            <a:endCxn id="66" idx="1"/>
+          </p:cNvCxnSpPr>
+          <p:nvPr/>
+        </p:nvCxnSpPr>
+        <p:spPr>
+          <a:xfrm>
+            <a:off x="4683639" y="2371685"/>
+            <a:ext cx="361388" cy="568011"/>
+          </a:xfrm>
+          <a:prstGeom prst="straightConnector1">
+            <a:avLst/>
+          </a:prstGeom>
+          <a:ln>
+            <a:solidFill>
+              <a:schemeClr val="tx1"/>
+            </a:solidFill>
+            <a:tailEnd type="triangle"/>
+          </a:ln>
+        </p:spPr>
+        <p:style>
+          <a:lnRef idx="3">
+            <a:schemeClr val="accent1"/>
+          </a:lnRef>
+          <a:fillRef idx="0">
+            <a:schemeClr val="accent1"/>
+          </a:fillRef>
+          <a:effectRef idx="2">
+            <a:schemeClr val="accent1"/>
+          </a:effectRef>
+          <a:fontRef idx="minor">
+            <a:schemeClr val="tx1"/>
+          </a:fontRef>
+        </p:style>
+      </p:cxnSp>
+      <p:sp>
+        <p:nvSpPr>
+          <p:cNvPr id="66" name="Oval 65">
+            <a:extLst>
+              <a:ext uri="{FF2B5EF4-FFF2-40B4-BE49-F238E27FC236}">
+                <a16:creationId xmlns:a16="http://schemas.microsoft.com/office/drawing/2014/main" id="{D3021493-EB27-0AF4-00B3-757F740F266D}"/>
+              </a:ext>
+            </a:extLst>
+          </p:cNvPr>
+          <p:cNvSpPr/>
+          <p:nvPr/>
+        </p:nvSpPr>
+        <p:spPr>
+          <a:xfrm>
+            <a:off x="4946489" y="2841158"/>
+            <a:ext cx="672860" cy="672860"/>
+          </a:xfrm>
+          <a:prstGeom prst="ellipse">
+            <a:avLst/>
+          </a:prstGeom>
+        </p:spPr>
+        <p:style>
+          <a:lnRef idx="2">
+            <a:schemeClr val="accent5">
+              <a:shade val="50000"/>
+            </a:schemeClr>
+          </a:lnRef>
+          <a:fillRef idx="1">
+            <a:schemeClr val="accent5"/>
+          </a:fillRef>
+          <a:effectRef idx="0">
+            <a:schemeClr val="accent5"/>
+          </a:effectRef>
+          <a:fontRef idx="minor">
+            <a:schemeClr val="lt1"/>
+          </a:fontRef>
+        </p:style>
+        <p:txBody>
+          <a:bodyPr rtlCol="0" anchor="ctr"/>
+          <a:lstStyle/>
+          <a:p>
+            <a:pPr algn="ctr"/>
+            <a:endParaRPr lang="en-US"/>
+          </a:p>
+        </p:txBody>
+      </p:sp>
+      <p:sp>
+        <p:nvSpPr>
+          <p:cNvPr id="69" name="Oval 68">
+            <a:extLst>
+              <a:ext uri="{FF2B5EF4-FFF2-40B4-BE49-F238E27FC236}">
+                <a16:creationId xmlns:a16="http://schemas.microsoft.com/office/drawing/2014/main" id="{3905762E-EBEB-4476-9B0E-7BE97C5B45B8}"/>
+              </a:ext>
+            </a:extLst>
+          </p:cNvPr>
+          <p:cNvSpPr/>
+          <p:nvPr/>
+        </p:nvSpPr>
+        <p:spPr>
+          <a:xfrm>
+            <a:off x="6116350" y="2841158"/>
+            <a:ext cx="672860" cy="672860"/>
+          </a:xfrm>
+          <a:prstGeom prst="ellipse">
+            <a:avLst/>
+          </a:prstGeom>
+        </p:spPr>
+        <p:style>
+          <a:lnRef idx="2">
+            <a:schemeClr val="accent5">
+              <a:shade val="50000"/>
+            </a:schemeClr>
+          </a:lnRef>
+          <a:fillRef idx="1">
+            <a:schemeClr val="accent5"/>
+          </a:fillRef>
+          <a:effectRef idx="0">
+            <a:schemeClr val="accent5"/>
+          </a:effectRef>
+          <a:fontRef idx="minor">
+            <a:schemeClr val="lt1"/>
+          </a:fontRef>
+        </p:style>
+        <p:txBody>
+          <a:bodyPr rtlCol="0" anchor="ctr"/>
+          <a:lstStyle/>
+          <a:p>
+            <a:pPr algn="ctr"/>
+            <a:endParaRPr lang="en-US"/>
+          </a:p>
+        </p:txBody>
+      </p:sp>
+      <p:sp>
+        <p:nvSpPr>
+          <p:cNvPr id="70" name="Oval 69">
+            <a:extLst>
+              <a:ext uri="{FF2B5EF4-FFF2-40B4-BE49-F238E27FC236}">
+                <a16:creationId xmlns:a16="http://schemas.microsoft.com/office/drawing/2014/main" id="{3518752A-7532-C162-DDE7-2EDCF40F816D}"/>
+              </a:ext>
+            </a:extLst>
+          </p:cNvPr>
+          <p:cNvSpPr/>
+          <p:nvPr/>
+        </p:nvSpPr>
+        <p:spPr>
+          <a:xfrm>
+            <a:off x="7286211" y="2841158"/>
+            <a:ext cx="672860" cy="672860"/>
+          </a:xfrm>
+          <a:prstGeom prst="ellipse">
+            <a:avLst/>
+          </a:prstGeom>
+        </p:spPr>
+        <p:style>
+          <a:lnRef idx="2">
+            <a:schemeClr val="accent5">
+              <a:shade val="50000"/>
+            </a:schemeClr>
+          </a:lnRef>
+          <a:fillRef idx="1">
+            <a:schemeClr val="accent5"/>
+          </a:fillRef>
+          <a:effectRef idx="0">
+            <a:schemeClr val="accent5"/>
+          </a:effectRef>
+          <a:fontRef idx="minor">
+            <a:schemeClr val="lt1"/>
+          </a:fontRef>
+        </p:style>
+        <p:txBody>
+          <a:bodyPr rtlCol="0" anchor="ctr"/>
+          <a:lstStyle/>
+          <a:p>
+            <a:pPr algn="ctr"/>
+            <a:endParaRPr lang="en-US"/>
+          </a:p>
+        </p:txBody>
+      </p:sp>
+      <p:sp>
+        <p:nvSpPr>
+          <p:cNvPr id="71" name="Oval 70">
+            <a:extLst>
+              <a:ext uri="{FF2B5EF4-FFF2-40B4-BE49-F238E27FC236}">
+                <a16:creationId xmlns:a16="http://schemas.microsoft.com/office/drawing/2014/main" id="{C3B6EB6C-45DA-4DC3-9BBC-36822493B114}"/>
+              </a:ext>
+            </a:extLst>
+          </p:cNvPr>
+          <p:cNvSpPr/>
+          <p:nvPr/>
+        </p:nvSpPr>
+        <p:spPr>
+          <a:xfrm>
+            <a:off x="8456072" y="2841158"/>
+            <a:ext cx="672860" cy="672860"/>
+          </a:xfrm>
+          <a:prstGeom prst="ellipse">
+            <a:avLst/>
+          </a:prstGeom>
+        </p:spPr>
+        <p:style>
+          <a:lnRef idx="2">
+            <a:schemeClr val="accent5">
+              <a:shade val="50000"/>
+            </a:schemeClr>
+          </a:lnRef>
+          <a:fillRef idx="1">
+            <a:schemeClr val="accent5"/>
+          </a:fillRef>
+          <a:effectRef idx="0">
+            <a:schemeClr val="accent5"/>
+          </a:effectRef>
+          <a:fontRef idx="minor">
+            <a:schemeClr val="lt1"/>
+          </a:fontRef>
+        </p:style>
+        <p:txBody>
+          <a:bodyPr rtlCol="0" anchor="ctr"/>
+          <a:lstStyle/>
+          <a:p>
+            <a:pPr algn="ctr"/>
+            <a:endParaRPr lang="en-US"/>
+          </a:p>
+        </p:txBody>
+      </p:sp>
+      <p:sp>
+        <p:nvSpPr>
+          <p:cNvPr id="72" name="Oval 71">
+            <a:extLst>
+              <a:ext uri="{FF2B5EF4-FFF2-40B4-BE49-F238E27FC236}">
+                <a16:creationId xmlns:a16="http://schemas.microsoft.com/office/drawing/2014/main" id="{B634E6A9-34B4-906F-EA1B-C943AA3D7233}"/>
+              </a:ext>
+            </a:extLst>
+          </p:cNvPr>
+          <p:cNvSpPr/>
+          <p:nvPr/>
+        </p:nvSpPr>
+        <p:spPr>
+          <a:xfrm>
+            <a:off x="9325423" y="1797363"/>
+            <a:ext cx="672860" cy="672860"/>
+          </a:xfrm>
+          <a:prstGeom prst="ellipse">
+            <a:avLst/>
+          </a:prstGeom>
+        </p:spPr>
+        <p:style>
+          <a:lnRef idx="2">
+            <a:schemeClr val="accent1">
+              <a:shade val="50000"/>
+            </a:schemeClr>
+          </a:lnRef>
+          <a:fillRef idx="1">
+            <a:schemeClr val="accent1"/>
+          </a:fillRef>
+          <a:effectRef idx="0">
+            <a:schemeClr val="accent1"/>
+          </a:effectRef>
+          <a:fontRef idx="minor">
+            <a:schemeClr val="lt1"/>
+          </a:fontRef>
+        </p:style>
+        <p:txBody>
+          <a:bodyPr rtlCol="0" anchor="ctr"/>
+          <a:lstStyle/>
+          <a:p>
+            <a:pPr algn="ctr"/>
+            <a:endParaRPr lang="en-US"/>
+          </a:p>
+        </p:txBody>
+      </p:sp>
+      <p:cxnSp>
+        <p:nvCxnSpPr>
+          <p:cNvPr id="75" name="Straight Arrow Connector 74">
+            <a:extLst>
+              <a:ext uri="{FF2B5EF4-FFF2-40B4-BE49-F238E27FC236}">
+                <a16:creationId xmlns:a16="http://schemas.microsoft.com/office/drawing/2014/main" id="{F8095CFA-57D3-520B-69E3-CF21C262C3E3}"/>
+              </a:ext>
+            </a:extLst>
+          </p:cNvPr>
+          <p:cNvCxnSpPr>
+            <a:cxnSpLocks/>
+            <a:stCxn id="66" idx="6"/>
+            <a:endCxn id="69" idx="2"/>
+          </p:cNvCxnSpPr>
+          <p:nvPr/>
+        </p:nvCxnSpPr>
+        <p:spPr>
+          <a:xfrm>
+            <a:off x="5619349" y="3177588"/>
+            <a:ext cx="497001" cy="0"/>
+          </a:xfrm>
+          <a:prstGeom prst="straightConnector1">
+            <a:avLst/>
+          </a:prstGeom>
+          <a:ln>
+            <a:solidFill>
+              <a:schemeClr val="tx1"/>
+            </a:solidFill>
+            <a:tailEnd type="triangle"/>
+          </a:ln>
+        </p:spPr>
+        <p:style>
+          <a:lnRef idx="3">
+            <a:schemeClr val="accent1"/>
+          </a:lnRef>
+          <a:fillRef idx="0">
+            <a:schemeClr val="accent1"/>
+          </a:fillRef>
+          <a:effectRef idx="2">
+            <a:schemeClr val="accent1"/>
+          </a:effectRef>
+          <a:fontRef idx="minor">
+            <a:schemeClr val="tx1"/>
+          </a:fontRef>
+        </p:style>
+      </p:cxnSp>
+      <p:cxnSp>
+        <p:nvCxnSpPr>
+          <p:cNvPr id="78" name="Straight Arrow Connector 77">
+            <a:extLst>
+              <a:ext uri="{FF2B5EF4-FFF2-40B4-BE49-F238E27FC236}">
+                <a16:creationId xmlns:a16="http://schemas.microsoft.com/office/drawing/2014/main" id="{BFC5AF40-492D-4C8D-C0B2-69B23E0AE81D}"/>
+              </a:ext>
+            </a:extLst>
+          </p:cNvPr>
+          <p:cNvCxnSpPr>
+            <a:cxnSpLocks/>
+            <a:stCxn id="69" idx="6"/>
+            <a:endCxn id="70" idx="2"/>
+          </p:cNvCxnSpPr>
+          <p:nvPr/>
+        </p:nvCxnSpPr>
+        <p:spPr>
+          <a:xfrm>
+            <a:off x="6789210" y="3177588"/>
+            <a:ext cx="497001" cy="0"/>
+          </a:xfrm>
+          <a:prstGeom prst="straightConnector1">
+            <a:avLst/>
+          </a:prstGeom>
+          <a:ln>
+            <a:solidFill>
+              <a:schemeClr val="tx1"/>
+            </a:solidFill>
+            <a:tailEnd type="triangle"/>
+          </a:ln>
+        </p:spPr>
+        <p:style>
+          <a:lnRef idx="3">
+            <a:schemeClr val="accent1"/>
+          </a:lnRef>
+          <a:fillRef idx="0">
+            <a:schemeClr val="accent1"/>
+          </a:fillRef>
+          <a:effectRef idx="2">
+            <a:schemeClr val="accent1"/>
+          </a:effectRef>
+          <a:fontRef idx="minor">
+            <a:schemeClr val="tx1"/>
+          </a:fontRef>
+        </p:style>
+      </p:cxnSp>
+      <p:cxnSp>
+        <p:nvCxnSpPr>
+          <p:cNvPr id="81" name="Straight Arrow Connector 80">
+            <a:extLst>
+              <a:ext uri="{FF2B5EF4-FFF2-40B4-BE49-F238E27FC236}">
+                <a16:creationId xmlns:a16="http://schemas.microsoft.com/office/drawing/2014/main" id="{896AFCA9-E768-7BE0-0861-B436223A69A1}"/>
+              </a:ext>
+            </a:extLst>
+          </p:cNvPr>
+          <p:cNvCxnSpPr>
+            <a:cxnSpLocks/>
+            <a:stCxn id="70" idx="6"/>
+            <a:endCxn id="71" idx="2"/>
+          </p:cNvCxnSpPr>
+          <p:nvPr/>
+        </p:nvCxnSpPr>
+        <p:spPr>
+          <a:xfrm>
+            <a:off x="7959071" y="3177588"/>
+            <a:ext cx="497001" cy="0"/>
+          </a:xfrm>
+          <a:prstGeom prst="straightConnector1">
+            <a:avLst/>
+          </a:prstGeom>
+          <a:ln>
+            <a:solidFill>
+              <a:schemeClr val="tx1"/>
+            </a:solidFill>
+            <a:tailEnd type="triangle"/>
+          </a:ln>
+        </p:spPr>
+        <p:style>
+          <a:lnRef idx="3">
+            <a:schemeClr val="accent1"/>
+          </a:lnRef>
+          <a:fillRef idx="0">
+            <a:schemeClr val="accent1"/>
+          </a:fillRef>
+          <a:effectRef idx="2">
+            <a:schemeClr val="accent1"/>
+          </a:effectRef>
+          <a:fontRef idx="minor">
+            <a:schemeClr val="tx1"/>
+          </a:fontRef>
+        </p:style>
+      </p:cxnSp>
+      <p:cxnSp>
+        <p:nvCxnSpPr>
+          <p:cNvPr id="84" name="Straight Arrow Connector 83">
+            <a:extLst>
+              <a:ext uri="{FF2B5EF4-FFF2-40B4-BE49-F238E27FC236}">
+                <a16:creationId xmlns:a16="http://schemas.microsoft.com/office/drawing/2014/main" id="{3EB9BEFF-A144-7879-22E2-9A45F8537CF0}"/>
+              </a:ext>
+            </a:extLst>
+          </p:cNvPr>
+          <p:cNvCxnSpPr>
+            <a:cxnSpLocks/>
+            <a:stCxn id="71" idx="7"/>
+            <a:endCxn id="72" idx="3"/>
+          </p:cNvCxnSpPr>
+          <p:nvPr/>
+        </p:nvCxnSpPr>
+        <p:spPr>
+          <a:xfrm flipV="1">
+            <a:off x="9030394" y="2371685"/>
+            <a:ext cx="393567" cy="568011"/>
+          </a:xfrm>
+          <a:prstGeom prst="straightConnector1">
+            <a:avLst/>
+          </a:prstGeom>
+          <a:ln>
+            <a:solidFill>
+              <a:schemeClr val="tx1"/>
+            </a:solidFill>
+            <a:tailEnd type="triangle"/>
+          </a:ln>
+        </p:spPr>
+        <p:style>
+          <a:lnRef idx="3">
+            <a:schemeClr val="accent1"/>
+          </a:lnRef>
+          <a:fillRef idx="0">
+            <a:schemeClr val="accent1"/>
+          </a:fillRef>
+          <a:effectRef idx="2">
+            <a:schemeClr val="accent1"/>
+          </a:effectRef>
+          <a:fontRef idx="minor">
+            <a:schemeClr val="tx1"/>
+          </a:fontRef>
+        </p:style>
+      </p:cxnSp>
+      <p:cxnSp>
+        <p:nvCxnSpPr>
+          <p:cNvPr id="91" name="Straight Arrow Connector 90">
+            <a:extLst>
+              <a:ext uri="{FF2B5EF4-FFF2-40B4-BE49-F238E27FC236}">
+                <a16:creationId xmlns:a16="http://schemas.microsoft.com/office/drawing/2014/main" id="{86235281-56EB-A9E8-1DB1-04ADCA7E6CF7}"/>
+              </a:ext>
+            </a:extLst>
+          </p:cNvPr>
+          <p:cNvCxnSpPr>
+            <a:cxnSpLocks/>
+            <a:stCxn id="72" idx="6"/>
+          </p:cNvCxnSpPr>
+          <p:nvPr/>
+        </p:nvCxnSpPr>
+        <p:spPr>
+          <a:xfrm>
+            <a:off x="9998283" y="2133793"/>
+            <a:ext cx="1168754" cy="8407"/>
+          </a:xfrm>
+          <a:prstGeom prst="straightConnector1">
+            <a:avLst/>
+          </a:prstGeom>
+          <a:ln>
+            <a:solidFill>
+              <a:schemeClr val="tx1"/>
+            </a:solidFill>
+            <a:tailEnd type="triangle"/>
+          </a:ln>
+        </p:spPr>
+        <p:style>
+          <a:lnRef idx="3">
+            <a:schemeClr val="accent1"/>
+          </a:lnRef>
+          <a:fillRef idx="0">
+            <a:schemeClr val="accent1"/>
+          </a:fillRef>
+          <a:effectRef idx="2">
+            <a:schemeClr val="accent1"/>
+          </a:effectRef>
+          <a:fontRef idx="minor">
+            <a:schemeClr val="tx1"/>
+          </a:fontRef>
+        </p:style>
+      </p:cxnSp>
+      <p:sp>
+        <p:nvSpPr>
+          <p:cNvPr id="94" name="TextBox 93">
+            <a:extLst>
+              <a:ext uri="{FF2B5EF4-FFF2-40B4-BE49-F238E27FC236}">
+                <a16:creationId xmlns:a16="http://schemas.microsoft.com/office/drawing/2014/main" id="{BCDBF8CD-4125-603F-3F79-5E7E12D607DA}"/>
+              </a:ext>
+            </a:extLst>
+          </p:cNvPr>
+          <p:cNvSpPr txBox="1"/>
+          <p:nvPr/>
+        </p:nvSpPr>
+        <p:spPr>
+          <a:xfrm>
+            <a:off x="10812281" y="1639226"/>
+            <a:ext cx="1280514" cy="830997"/>
+          </a:xfrm>
+          <a:prstGeom prst="rect">
+            <a:avLst/>
+          </a:prstGeom>
+          <a:noFill/>
+        </p:spPr>
+        <p:txBody>
+          <a:bodyPr wrap="square" rtlCol="0">
+            <a:spAutoFit/>
+          </a:bodyPr>
+          <a:lstStyle/>
+          <a:p>
+            <a:pPr algn="ctr"/>
+            <a:r>
+              <a:rPr lang="en-US" sz="4800" dirty="0">
+                <a:latin typeface="Segoe Print" panose="02000600000000000000" pitchFamily="2" charset="0"/>
+              </a:rPr>
+              <a:t>…</a:t>
+            </a:r>
+          </a:p>
+        </p:txBody>
+      </p:sp>
+      <p:sp>
+        <p:nvSpPr>
+          <p:cNvPr id="95" name="TextBox 94">
+            <a:extLst>
+              <a:ext uri="{FF2B5EF4-FFF2-40B4-BE49-F238E27FC236}">
+                <a16:creationId xmlns:a16="http://schemas.microsoft.com/office/drawing/2014/main" id="{20A35774-ABF9-3B8A-4C56-FDDF6FFB149A}"/>
+              </a:ext>
+            </a:extLst>
+          </p:cNvPr>
+          <p:cNvSpPr txBox="1"/>
+          <p:nvPr/>
+        </p:nvSpPr>
+        <p:spPr>
+          <a:xfrm>
+            <a:off x="3046710" y="2573995"/>
+            <a:ext cx="1880760" cy="307777"/>
+          </a:xfrm>
+          <a:prstGeom prst="rect">
+            <a:avLst/>
+          </a:prstGeom>
+          <a:noFill/>
+        </p:spPr>
+        <p:txBody>
+          <a:bodyPr wrap="square" rtlCol="0">
+            <a:spAutoFit/>
+          </a:bodyPr>
+          <a:lstStyle/>
+          <a:p>
+            <a:pPr algn="ctr"/>
+            <a:r>
+              <a:rPr lang="en-US" sz="1400" dirty="0">
+                <a:latin typeface="Segoe Print" panose="02000600000000000000" pitchFamily="2" charset="0"/>
+              </a:rPr>
+              <a:t>Changing branch</a:t>
+            </a:r>
+          </a:p>
+        </p:txBody>
+      </p:sp>
+      <p:sp>
+        <p:nvSpPr>
+          <p:cNvPr id="113" name="TextBox 112">
+            <a:extLst>
+              <a:ext uri="{FF2B5EF4-FFF2-40B4-BE49-F238E27FC236}">
+                <a16:creationId xmlns:a16="http://schemas.microsoft.com/office/drawing/2014/main" id="{86110EFF-E5C9-22BB-E196-C1D699792FA6}"/>
+              </a:ext>
+            </a:extLst>
+          </p:cNvPr>
+          <p:cNvSpPr txBox="1"/>
+          <p:nvPr/>
+        </p:nvSpPr>
+        <p:spPr>
+          <a:xfrm>
+            <a:off x="4753255" y="1861919"/>
+            <a:ext cx="1123685" cy="261610"/>
+          </a:xfrm>
+          <a:prstGeom prst="rect">
+            <a:avLst/>
+          </a:prstGeom>
+          <a:noFill/>
+        </p:spPr>
+        <p:txBody>
+          <a:bodyPr wrap="square" rtlCol="0">
+            <a:spAutoFit/>
+          </a:bodyPr>
+          <a:lstStyle/>
+          <a:p>
+            <a:pPr algn="ctr"/>
+            <a:r>
+              <a:rPr lang="en-US" sz="1100" dirty="0">
+                <a:latin typeface="Segoe Print" panose="02000600000000000000" pitchFamily="2" charset="0"/>
+              </a:rPr>
+              <a:t>New Commit</a:t>
+            </a:r>
+          </a:p>
+        </p:txBody>
+      </p:sp>
+      <p:sp>
+        <p:nvSpPr>
+          <p:cNvPr id="114" name="TextBox 113">
+            <a:extLst>
+              <a:ext uri="{FF2B5EF4-FFF2-40B4-BE49-F238E27FC236}">
+                <a16:creationId xmlns:a16="http://schemas.microsoft.com/office/drawing/2014/main" id="{3DA3499D-8224-A833-5662-E82B94591B04}"/>
+              </a:ext>
+            </a:extLst>
+          </p:cNvPr>
+          <p:cNvSpPr txBox="1"/>
+          <p:nvPr/>
+        </p:nvSpPr>
+        <p:spPr>
+          <a:xfrm>
+            <a:off x="6491440" y="1856004"/>
+            <a:ext cx="1123685" cy="261610"/>
+          </a:xfrm>
+          <a:prstGeom prst="rect">
+            <a:avLst/>
+          </a:prstGeom>
+          <a:noFill/>
+        </p:spPr>
+        <p:txBody>
+          <a:bodyPr wrap="square" rtlCol="0">
+            <a:spAutoFit/>
+          </a:bodyPr>
+          <a:lstStyle/>
+          <a:p>
+            <a:pPr algn="ctr"/>
+            <a:r>
+              <a:rPr lang="en-US" sz="1100" dirty="0">
+                <a:latin typeface="Segoe Print" panose="02000600000000000000" pitchFamily="2" charset="0"/>
+              </a:rPr>
+              <a:t>New Commit</a:t>
+            </a:r>
+          </a:p>
+        </p:txBody>
+      </p:sp>
+      <p:sp>
+        <p:nvSpPr>
+          <p:cNvPr id="115" name="TextBox 114">
+            <a:extLst>
+              <a:ext uri="{FF2B5EF4-FFF2-40B4-BE49-F238E27FC236}">
+                <a16:creationId xmlns:a16="http://schemas.microsoft.com/office/drawing/2014/main" id="{FB743170-7DC6-F078-AF0B-68E6F1937690}"/>
+              </a:ext>
+            </a:extLst>
+          </p:cNvPr>
+          <p:cNvSpPr txBox="1"/>
+          <p:nvPr/>
+        </p:nvSpPr>
+        <p:spPr>
+          <a:xfrm>
+            <a:off x="8229625" y="1856004"/>
+            <a:ext cx="1123685" cy="261610"/>
+          </a:xfrm>
+          <a:prstGeom prst="rect">
+            <a:avLst/>
+          </a:prstGeom>
+          <a:noFill/>
+        </p:spPr>
+        <p:txBody>
+          <a:bodyPr wrap="square" rtlCol="0">
+            <a:spAutoFit/>
+          </a:bodyPr>
+          <a:lstStyle/>
+          <a:p>
+            <a:pPr algn="ctr"/>
+            <a:r>
+              <a:rPr lang="en-US" sz="1100" dirty="0">
+                <a:latin typeface="Segoe Print" panose="02000600000000000000" pitchFamily="2" charset="0"/>
+              </a:rPr>
+              <a:t>New Commit</a:t>
+            </a:r>
+          </a:p>
+        </p:txBody>
+      </p:sp>
+      <p:sp>
+        <p:nvSpPr>
+          <p:cNvPr id="116" name="TextBox 115">
+            <a:extLst>
+              <a:ext uri="{FF2B5EF4-FFF2-40B4-BE49-F238E27FC236}">
+                <a16:creationId xmlns:a16="http://schemas.microsoft.com/office/drawing/2014/main" id="{7C279546-51A1-5CEF-D784-548F102292AE}"/>
+              </a:ext>
+            </a:extLst>
+          </p:cNvPr>
+          <p:cNvSpPr txBox="1"/>
+          <p:nvPr/>
+        </p:nvSpPr>
+        <p:spPr>
+          <a:xfrm>
+            <a:off x="9967810" y="1856004"/>
+            <a:ext cx="1123685" cy="261610"/>
+          </a:xfrm>
+          <a:prstGeom prst="rect">
+            <a:avLst/>
+          </a:prstGeom>
+          <a:noFill/>
+        </p:spPr>
+        <p:txBody>
+          <a:bodyPr wrap="square" rtlCol="0">
+            <a:spAutoFit/>
+          </a:bodyPr>
+          <a:lstStyle/>
+          <a:p>
+            <a:pPr algn="ctr"/>
+            <a:r>
+              <a:rPr lang="en-US" sz="1100" dirty="0">
+                <a:latin typeface="Segoe Print" panose="02000600000000000000" pitchFamily="2" charset="0"/>
+              </a:rPr>
+              <a:t>New Commit</a:t>
+            </a:r>
+          </a:p>
+        </p:txBody>
+      </p:sp>
+      <p:sp>
+        <p:nvSpPr>
+          <p:cNvPr id="118" name="TextBox 117">
+            <a:extLst>
+              <a:ext uri="{FF2B5EF4-FFF2-40B4-BE49-F238E27FC236}">
+                <a16:creationId xmlns:a16="http://schemas.microsoft.com/office/drawing/2014/main" id="{1D408622-39FB-4D58-AF54-0F3949AECBE4}"/>
+              </a:ext>
+            </a:extLst>
+          </p:cNvPr>
+          <p:cNvSpPr txBox="1"/>
+          <p:nvPr/>
+        </p:nvSpPr>
+        <p:spPr>
+          <a:xfrm>
+            <a:off x="5349762" y="3469192"/>
+            <a:ext cx="1123685" cy="261610"/>
+          </a:xfrm>
+          <a:prstGeom prst="rect">
+            <a:avLst/>
+          </a:prstGeom>
+          <a:noFill/>
+        </p:spPr>
+        <p:txBody>
+          <a:bodyPr wrap="square" rtlCol="0">
+            <a:spAutoFit/>
+          </a:bodyPr>
+          <a:lstStyle/>
+          <a:p>
+            <a:pPr algn="ctr"/>
+            <a:r>
+              <a:rPr lang="en-US" sz="1100" dirty="0">
+                <a:latin typeface="Segoe Print" panose="02000600000000000000" pitchFamily="2" charset="0"/>
+              </a:rPr>
+              <a:t>New Commit</a:t>
+            </a:r>
+          </a:p>
+        </p:txBody>
+      </p:sp>
+      <p:sp>
+        <p:nvSpPr>
+          <p:cNvPr id="119" name="TextBox 118">
+            <a:extLst>
+              <a:ext uri="{FF2B5EF4-FFF2-40B4-BE49-F238E27FC236}">
+                <a16:creationId xmlns:a16="http://schemas.microsoft.com/office/drawing/2014/main" id="{7E9BBEE6-F263-243A-620A-B3D372D3D4BD}"/>
+              </a:ext>
+            </a:extLst>
+          </p:cNvPr>
+          <p:cNvSpPr txBox="1"/>
+          <p:nvPr/>
+        </p:nvSpPr>
+        <p:spPr>
+          <a:xfrm>
+            <a:off x="6463036" y="3467828"/>
+            <a:ext cx="1123685" cy="261610"/>
+          </a:xfrm>
+          <a:prstGeom prst="rect">
+            <a:avLst/>
+          </a:prstGeom>
+          <a:noFill/>
+        </p:spPr>
+        <p:txBody>
+          <a:bodyPr wrap="square" rtlCol="0">
+            <a:spAutoFit/>
+          </a:bodyPr>
+          <a:lstStyle/>
+          <a:p>
+            <a:pPr algn="ctr"/>
+            <a:r>
+              <a:rPr lang="en-US" sz="1100" dirty="0">
+                <a:latin typeface="Segoe Print" panose="02000600000000000000" pitchFamily="2" charset="0"/>
+              </a:rPr>
+              <a:t>New Commit</a:t>
+            </a:r>
+          </a:p>
+        </p:txBody>
+      </p:sp>
+      <p:sp>
+        <p:nvSpPr>
+          <p:cNvPr id="120" name="TextBox 119">
+            <a:extLst>
+              <a:ext uri="{FF2B5EF4-FFF2-40B4-BE49-F238E27FC236}">
+                <a16:creationId xmlns:a16="http://schemas.microsoft.com/office/drawing/2014/main" id="{41F0F1E3-B239-A964-6AEC-940931B1F5E9}"/>
+              </a:ext>
+            </a:extLst>
+          </p:cNvPr>
+          <p:cNvSpPr txBox="1"/>
+          <p:nvPr/>
+        </p:nvSpPr>
+        <p:spPr>
+          <a:xfrm>
+            <a:off x="7576310" y="3466464"/>
+            <a:ext cx="1123685" cy="261610"/>
+          </a:xfrm>
+          <a:prstGeom prst="rect">
+            <a:avLst/>
+          </a:prstGeom>
+          <a:noFill/>
+        </p:spPr>
+        <p:txBody>
+          <a:bodyPr wrap="square" rtlCol="0">
+            <a:spAutoFit/>
+          </a:bodyPr>
+          <a:lstStyle/>
+          <a:p>
+            <a:pPr algn="ctr"/>
+            <a:r>
+              <a:rPr lang="en-US" sz="1100" dirty="0">
+                <a:latin typeface="Segoe Print" panose="02000600000000000000" pitchFamily="2" charset="0"/>
+              </a:rPr>
+              <a:t>New Commit</a:t>
+            </a:r>
+          </a:p>
+        </p:txBody>
+      </p:sp>
+      <p:sp>
+        <p:nvSpPr>
+          <p:cNvPr id="122" name="TextBox 121">
+            <a:extLst>
+              <a:ext uri="{FF2B5EF4-FFF2-40B4-BE49-F238E27FC236}">
+                <a16:creationId xmlns:a16="http://schemas.microsoft.com/office/drawing/2014/main" id="{63FF4BAF-4357-C646-633D-7217DFCEBFCC}"/>
+              </a:ext>
+            </a:extLst>
+          </p:cNvPr>
+          <p:cNvSpPr txBox="1"/>
+          <p:nvPr/>
+        </p:nvSpPr>
+        <p:spPr>
+          <a:xfrm>
+            <a:off x="0" y="4188480"/>
+            <a:ext cx="12191999" cy="1323439"/>
+          </a:xfrm>
+          <a:prstGeom prst="rect">
+            <a:avLst/>
+          </a:prstGeom>
+          <a:noFill/>
+        </p:spPr>
+        <p:txBody>
+          <a:bodyPr wrap="square" rtlCol="0">
+            <a:spAutoFit/>
+          </a:bodyPr>
+          <a:lstStyle/>
+          <a:p>
+            <a:pPr marL="285750" indent="-285750">
+              <a:buFont typeface="Arial" panose="020B0604020202020204" pitchFamily="34" charset="0"/>
+              <a:buChar char="•"/>
+            </a:pPr>
+            <a:r>
+              <a:rPr lang="en-US" sz="2000" dirty="0">
+                <a:latin typeface="Segoe Print" panose="02000600000000000000" pitchFamily="2" charset="0"/>
+              </a:rPr>
+              <a:t>Every Circle in this picture contains the all codes of project after one special commit.</a:t>
+            </a:r>
+          </a:p>
+          <a:p>
+            <a:pPr marL="285750" indent="-285750">
+              <a:buFont typeface="Arial" panose="020B0604020202020204" pitchFamily="34" charset="0"/>
+              <a:buChar char="•"/>
+            </a:pPr>
+            <a:r>
+              <a:rPr lang="en-US" sz="2000" dirty="0">
+                <a:latin typeface="Segoe Print" panose="02000600000000000000" pitchFamily="2" charset="0"/>
+              </a:rPr>
+              <a:t>After merging if 2 branches modify one file usually we have “conflict” error and we should fix that by our hands.</a:t>
+            </a:r>
+          </a:p>
+          <a:p>
+            <a:pPr marL="285750" indent="-285750">
+              <a:buFont typeface="Arial" panose="020B0604020202020204" pitchFamily="34" charset="0"/>
+              <a:buChar char="•"/>
+            </a:pPr>
+            <a:r>
+              <a:rPr lang="en-US" sz="2000" dirty="0">
+                <a:latin typeface="Segoe Print" panose="02000600000000000000" pitchFamily="2" charset="0"/>
+              </a:rPr>
+              <a:t>Try to don’t code in one file :) .</a:t>
+            </a:r>
+          </a:p>
+        </p:txBody>
+      </p:sp>
+      <p:sp>
+        <p:nvSpPr>
+          <p:cNvPr id="146" name="TextBox 145">
+            <a:extLst>
+              <a:ext uri="{FF2B5EF4-FFF2-40B4-BE49-F238E27FC236}">
+                <a16:creationId xmlns:a16="http://schemas.microsoft.com/office/drawing/2014/main" id="{EE762FD3-266F-2C14-FF60-473D1E948208}"/>
+              </a:ext>
+            </a:extLst>
+          </p:cNvPr>
+          <p:cNvSpPr txBox="1"/>
+          <p:nvPr/>
+        </p:nvSpPr>
+        <p:spPr>
+          <a:xfrm>
+            <a:off x="9088957" y="2562633"/>
+            <a:ext cx="1244330" cy="307777"/>
+          </a:xfrm>
+          <a:prstGeom prst="rect">
+            <a:avLst/>
+          </a:prstGeom>
+          <a:noFill/>
+        </p:spPr>
+        <p:txBody>
+          <a:bodyPr wrap="square" rtlCol="0">
+            <a:spAutoFit/>
+          </a:bodyPr>
+          <a:lstStyle/>
+          <a:p>
+            <a:pPr algn="ctr"/>
+            <a:r>
+              <a:rPr lang="en-US" sz="1400" dirty="0">
+                <a:latin typeface="Segoe Print" panose="02000600000000000000" pitchFamily="2" charset="0"/>
+              </a:rPr>
+              <a:t>Merging</a:t>
+            </a:r>
+          </a:p>
+        </p:txBody>
+      </p:sp>
+      <p:sp>
+        <p:nvSpPr>
+          <p:cNvPr id="147" name="Rectangle 146">
+            <a:extLst>
+              <a:ext uri="{FF2B5EF4-FFF2-40B4-BE49-F238E27FC236}">
+                <a16:creationId xmlns:a16="http://schemas.microsoft.com/office/drawing/2014/main" id="{922E4324-3067-F957-8644-8BFA1FAD76A4}"/>
+              </a:ext>
+            </a:extLst>
+          </p:cNvPr>
+          <p:cNvSpPr/>
+          <p:nvPr/>
+        </p:nvSpPr>
+        <p:spPr>
+          <a:xfrm>
+            <a:off x="2193717" y="1725806"/>
+            <a:ext cx="7852492" cy="809925"/>
+          </a:xfrm>
+          <a:prstGeom prst="rect">
+            <a:avLst/>
+          </a:prstGeom>
+          <a:noFill/>
+          <a:ln w="9525" cap="flat" cmpd="sng" algn="ctr">
+            <a:solidFill>
+              <a:schemeClr val="accent1"/>
+            </a:solidFill>
+            <a:prstDash val="solid"/>
+            <a:round/>
+            <a:headEnd type="none" w="med" len="med"/>
+            <a:tailEnd type="none" w="med" len="med"/>
+          </a:ln>
+        </p:spPr>
+        <p:style>
+          <a:lnRef idx="0">
+            <a:scrgbClr r="0" g="0" b="0"/>
+          </a:lnRef>
+          <a:fillRef idx="0">
+            <a:scrgbClr r="0" g="0" b="0"/>
+          </a:fillRef>
+          <a:effectRef idx="0">
+            <a:scrgbClr r="0" g="0" b="0"/>
+          </a:effectRef>
+          <a:fontRef idx="minor">
+            <a:schemeClr val="accent1"/>
+          </a:fontRef>
+        </p:style>
+        <p:txBody>
+          <a:bodyPr rtlCol="0" anchor="ctr"/>
+          <a:lstStyle/>
+          <a:p>
+            <a:pPr algn="ctr"/>
+            <a:endParaRPr lang="en-US"/>
+          </a:p>
+        </p:txBody>
+      </p:sp>
+      <p:sp>
+        <p:nvSpPr>
+          <p:cNvPr id="148" name="Rectangle 147">
+            <a:extLst>
+              <a:ext uri="{FF2B5EF4-FFF2-40B4-BE49-F238E27FC236}">
+                <a16:creationId xmlns:a16="http://schemas.microsoft.com/office/drawing/2014/main" id="{729EF7EE-160F-2035-8100-B2D7939D8FFD}"/>
+              </a:ext>
+            </a:extLst>
+          </p:cNvPr>
+          <p:cNvSpPr/>
+          <p:nvPr/>
+        </p:nvSpPr>
+        <p:spPr>
+          <a:xfrm>
+            <a:off x="4782177" y="2792075"/>
+            <a:ext cx="4459359" cy="935999"/>
+          </a:xfrm>
+          <a:prstGeom prst="rect">
+            <a:avLst/>
+          </a:prstGeom>
+          <a:noFill/>
+          <a:ln w="9525" cap="flat" cmpd="sng" algn="ctr">
+            <a:solidFill>
+              <a:schemeClr val="accent5"/>
+            </a:solidFill>
+            <a:prstDash val="solid"/>
+            <a:round/>
+            <a:headEnd type="none" w="med" len="med"/>
+            <a:tailEnd type="none" w="med" len="med"/>
           </a:ln>
         </p:spPr>
         <p:style>
@@ -6600,97 +8140,184 @@
           <a:bodyPr rtlCol="0" anchor="ctr"/>
           <a:lstStyle/>
           <a:p>
-            <a:pPr marL="457200" indent="-457200" algn="just">
-              <a:buFont typeface="Arial" panose="020B0604020202020204" pitchFamily="34" charset="0"/>
-              <a:buChar char="•"/>
-            </a:pPr>
-            <a:r>
-              <a:rPr lang="en-US" sz="3200" dirty="0">
-                <a:ln w="0"/>
-                <a:solidFill>
-                  <a:schemeClr val="tx1"/>
-                </a:solidFill>
-                <a:effectLst>
-                  <a:outerShdw blurRad="38100" dist="19050" dir="2700000" algn="tl" rotWithShape="0">
-                    <a:schemeClr val="dk1">
-                      <a:alpha val="40000"/>
-                    </a:schemeClr>
-                  </a:outerShdw>
-                </a:effectLst>
-                <a:latin typeface="Poor Richard" panose="02080502050505020702" pitchFamily="18" charset="0"/>
+            <a:pPr algn="ctr"/>
+            <a:endParaRPr lang="en-US"/>
+          </a:p>
+        </p:txBody>
+      </p:sp>
+      <p:cxnSp>
+        <p:nvCxnSpPr>
+          <p:cNvPr id="149" name="Connector: Curved 148">
+            <a:extLst>
+              <a:ext uri="{FF2B5EF4-FFF2-40B4-BE49-F238E27FC236}">
+                <a16:creationId xmlns:a16="http://schemas.microsoft.com/office/drawing/2014/main" id="{03CD3971-03F3-E1EC-BF92-30B01AFEE5B3}"/>
+              </a:ext>
+            </a:extLst>
+          </p:cNvPr>
+          <p:cNvCxnSpPr>
+            <a:cxnSpLocks/>
+            <a:endCxn id="153" idx="3"/>
+          </p:cNvCxnSpPr>
+          <p:nvPr/>
+        </p:nvCxnSpPr>
+        <p:spPr>
+          <a:xfrm rot="5400000">
+            <a:off x="1708886" y="2565901"/>
+            <a:ext cx="515006" cy="454665"/>
+          </a:xfrm>
+          <a:prstGeom prst="curvedConnector2">
+            <a:avLst/>
+          </a:prstGeom>
+          <a:ln>
+            <a:solidFill>
+              <a:schemeClr val="tx1"/>
+            </a:solidFill>
+            <a:tailEnd type="triangle"/>
+          </a:ln>
+        </p:spPr>
+        <p:style>
+          <a:lnRef idx="1">
+            <a:schemeClr val="accent1"/>
+          </a:lnRef>
+          <a:fillRef idx="0">
+            <a:schemeClr val="accent1"/>
+          </a:fillRef>
+          <a:effectRef idx="0">
+            <a:schemeClr val="accent1"/>
+          </a:effectRef>
+          <a:fontRef idx="minor">
+            <a:schemeClr val="tx1"/>
+          </a:fontRef>
+        </p:style>
+      </p:cxnSp>
+      <p:sp>
+        <p:nvSpPr>
+          <p:cNvPr id="153" name="TextBox 152">
+            <a:extLst>
+              <a:ext uri="{FF2B5EF4-FFF2-40B4-BE49-F238E27FC236}">
+                <a16:creationId xmlns:a16="http://schemas.microsoft.com/office/drawing/2014/main" id="{DAC57981-DA26-D0F8-90E6-A8804C411588}"/>
+              </a:ext>
+            </a:extLst>
+          </p:cNvPr>
+          <p:cNvSpPr txBox="1"/>
+          <p:nvPr/>
+        </p:nvSpPr>
+        <p:spPr>
+          <a:xfrm>
+            <a:off x="-141704" y="2896847"/>
+            <a:ext cx="1880760" cy="307777"/>
+          </a:xfrm>
+          <a:prstGeom prst="rect">
+            <a:avLst/>
+          </a:prstGeom>
+          <a:noFill/>
+        </p:spPr>
+        <p:txBody>
+          <a:bodyPr wrap="square" rtlCol="0">
+            <a:spAutoFit/>
+          </a:bodyPr>
+          <a:lstStyle/>
+          <a:p>
+            <a:pPr algn="ctr"/>
+            <a:r>
+              <a:rPr lang="en-US" sz="1400" dirty="0">
+                <a:latin typeface="Segoe Print" panose="02000600000000000000" pitchFamily="2" charset="0"/>
               </a:rPr>
-              <a:t>Search bar in github.com can be very useful. It search the word inputted word in scope that you are now for example if you are in the specific repository it search inputted word in that repository and you search in first page of github.com it search the word in all of repository in the world!</a:t>
-            </a:r>
-          </a:p>
-          <a:p>
-            <a:pPr marL="457200" indent="-457200" algn="just">
-              <a:buFont typeface="Arial" panose="020B0604020202020204" pitchFamily="34" charset="0"/>
-              <a:buChar char="•"/>
-            </a:pPr>
-            <a:r>
-              <a:rPr lang="en-US" sz="3200" dirty="0">
-                <a:ln w="0"/>
-                <a:solidFill>
-                  <a:schemeClr val="tx1"/>
-                </a:solidFill>
-                <a:effectLst>
-                  <a:outerShdw blurRad="38100" dist="19050" dir="2700000" algn="tl" rotWithShape="0">
-                    <a:schemeClr val="dk1">
-                      <a:alpha val="40000"/>
-                    </a:schemeClr>
-                  </a:outerShdw>
-                </a:effectLst>
-                <a:latin typeface="Poor Richard" panose="02080502050505020702" pitchFamily="18" charset="0"/>
+              <a:t>Master Branch</a:t>
+            </a:r>
+          </a:p>
+        </p:txBody>
+      </p:sp>
+      <p:sp>
+        <p:nvSpPr>
+          <p:cNvPr id="155" name="TextBox 154">
+            <a:extLst>
+              <a:ext uri="{FF2B5EF4-FFF2-40B4-BE49-F238E27FC236}">
+                <a16:creationId xmlns:a16="http://schemas.microsoft.com/office/drawing/2014/main" id="{38F3A6AE-D883-FC0B-17F0-4C83058A61AB}"/>
+              </a:ext>
+            </a:extLst>
+          </p:cNvPr>
+          <p:cNvSpPr txBox="1"/>
+          <p:nvPr/>
+        </p:nvSpPr>
+        <p:spPr>
+          <a:xfrm>
+            <a:off x="1980300" y="3185561"/>
+            <a:ext cx="1880760" cy="307777"/>
+          </a:xfrm>
+          <a:prstGeom prst="rect">
+            <a:avLst/>
+          </a:prstGeom>
+          <a:noFill/>
+        </p:spPr>
+        <p:txBody>
+          <a:bodyPr wrap="square" rtlCol="0">
+            <a:spAutoFit/>
+          </a:bodyPr>
+          <a:lstStyle/>
+          <a:p>
+            <a:pPr algn="ctr"/>
+            <a:r>
+              <a:rPr lang="en-US" sz="1400" dirty="0">
+                <a:latin typeface="Segoe Print" panose="02000600000000000000" pitchFamily="2" charset="0"/>
               </a:rPr>
-              <a:t>After search you can find your searched word in Codes, Commits, Issues, Discussions, Packages and Wikis.</a:t>
-            </a:r>
-          </a:p>
-          <a:p>
-            <a:pPr marL="457200" indent="-457200" algn="just">
-              <a:buFont typeface="Arial" panose="020B0604020202020204" pitchFamily="34" charset="0"/>
-              <a:buChar char="•"/>
-            </a:pPr>
-            <a:r>
-              <a:rPr lang="en-US" sz="3200" dirty="0">
-                <a:ln w="0"/>
-                <a:solidFill>
-                  <a:schemeClr val="tx1"/>
-                </a:solidFill>
-                <a:effectLst>
-                  <a:outerShdw blurRad="38100" dist="19050" dir="2700000" algn="tl" rotWithShape="0">
-                    <a:schemeClr val="dk1">
-                      <a:alpha val="40000"/>
-                    </a:schemeClr>
-                  </a:outerShdw>
-                </a:effectLst>
-                <a:latin typeface="Poor Richard" panose="02080502050505020702" pitchFamily="18" charset="0"/>
-              </a:rPr>
-              <a:t>You can see the programming languages that use from the inputted word.</a:t>
-            </a:r>
-          </a:p>
-          <a:p>
-            <a:pPr algn="just"/>
-            <a:endParaRPr lang="en-US" sz="2000" dirty="0">
-              <a:ln w="0"/>
-              <a:solidFill>
-                <a:schemeClr val="tx1"/>
-              </a:solidFill>
-              <a:effectLst>
-                <a:outerShdw blurRad="38100" dist="19050" dir="2700000" algn="tl" rotWithShape="0">
-                  <a:schemeClr val="dk1">
-                    <a:alpha val="40000"/>
-                  </a:schemeClr>
-                </a:outerShdw>
-              </a:effectLst>
-              <a:latin typeface="Poor Richard" panose="02080502050505020702" pitchFamily="18" charset="0"/>
-            </a:endParaRPr>
-          </a:p>
-        </p:txBody>
-      </p:sp>
+              <a:t>New Branch</a:t>
+            </a:r>
+          </a:p>
+        </p:txBody>
+      </p:sp>
+      <p:cxnSp>
+        <p:nvCxnSpPr>
+          <p:cNvPr id="156" name="Connector: Curved 155">
+            <a:extLst>
+              <a:ext uri="{FF2B5EF4-FFF2-40B4-BE49-F238E27FC236}">
+                <a16:creationId xmlns:a16="http://schemas.microsoft.com/office/drawing/2014/main" id="{416205FA-1F13-0BAC-11EE-F5D8731DC413}"/>
+              </a:ext>
+            </a:extLst>
+          </p:cNvPr>
+          <p:cNvCxnSpPr>
+            <a:cxnSpLocks/>
+            <a:stCxn id="148" idx="1"/>
+            <a:endCxn id="155" idx="3"/>
+          </p:cNvCxnSpPr>
+          <p:nvPr/>
+        </p:nvCxnSpPr>
+        <p:spPr>
+          <a:xfrm rot="10800000" flipV="1">
+            <a:off x="3861061" y="3260074"/>
+            <a:ext cx="921117" cy="79375"/>
+          </a:xfrm>
+          <a:prstGeom prst="curvedConnector3">
+            <a:avLst>
+              <a:gd name="adj1" fmla="val -738"/>
+            </a:avLst>
+          </a:prstGeom>
+          <a:ln>
+            <a:solidFill>
+              <a:schemeClr val="tx1"/>
+            </a:solidFill>
+            <a:tailEnd type="triangle"/>
+          </a:ln>
+        </p:spPr>
+        <p:style>
+          <a:lnRef idx="1">
+            <a:schemeClr val="accent1"/>
+          </a:lnRef>
+          <a:fillRef idx="0">
+            <a:schemeClr val="accent1"/>
+          </a:fillRef>
+          <a:effectRef idx="0">
+            <a:schemeClr val="accent1"/>
+          </a:effectRef>
+          <a:fontRef idx="minor">
+            <a:schemeClr val="tx1"/>
+          </a:fontRef>
+        </p:style>
+      </p:cxnSp>
     </p:spTree>
     <p:extLst>
       <p:ext uri="{BB962C8B-B14F-4D97-AF65-F5344CB8AC3E}">
-        <p14:creationId xmlns:p14="http://schemas.microsoft.com/office/powerpoint/2010/main" val="2002756075"/>
+        <p14:creationId xmlns:p14="http://schemas.microsoft.com/office/powerpoint/2010/main" val="2385681155"/>
       </p:ext>
     </p:extLst>
   </p:cSld>
@@ -6780,17 +8407,914 @@
                 </a:effectLst>
                 <a:latin typeface="Poor Richard" panose="02080502050505020702" pitchFamily="18" charset="0"/>
               </a:rPr>
-              <a:t>Comparing codes</a:t>
-            </a:r>
-          </a:p>
-        </p:txBody>
-      </p:sp>
-      <p:sp>
-        <p:nvSpPr>
-          <p:cNvPr id="3" name="Rectangle: Rounded Corners 2">
+              <a:t>Git Big Picture (Remote)</a:t>
+            </a:r>
+          </a:p>
+        </p:txBody>
+      </p:sp>
+      <p:sp>
+        <p:nvSpPr>
+          <p:cNvPr id="51" name="Rectangle: Rounded Corners 50">
             <a:extLst>
               <a:ext uri="{FF2B5EF4-FFF2-40B4-BE49-F238E27FC236}">
-                <a16:creationId xmlns:a16="http://schemas.microsoft.com/office/drawing/2014/main" id="{EA2FC01D-16C5-48D7-8B7C-B82949EA46C4}"/>
+                <a16:creationId xmlns:a16="http://schemas.microsoft.com/office/drawing/2014/main" id="{26DDB901-E705-9780-7DCF-ECD8D0EEEB2D}"/>
+              </a:ext>
+            </a:extLst>
+          </p:cNvPr>
+          <p:cNvSpPr/>
+          <p:nvPr/>
+        </p:nvSpPr>
+        <p:spPr>
+          <a:xfrm>
+            <a:off x="6570482" y="4472708"/>
+            <a:ext cx="3634692" cy="1234559"/>
+          </a:xfrm>
+          <a:prstGeom prst="roundRect">
+            <a:avLst/>
+          </a:prstGeom>
+        </p:spPr>
+        <p:style>
+          <a:lnRef idx="2">
+            <a:schemeClr val="accent5">
+              <a:shade val="50000"/>
+            </a:schemeClr>
+          </a:lnRef>
+          <a:fillRef idx="1">
+            <a:schemeClr val="accent5"/>
+          </a:fillRef>
+          <a:effectRef idx="0">
+            <a:schemeClr val="accent5"/>
+          </a:effectRef>
+          <a:fontRef idx="minor">
+            <a:schemeClr val="lt1"/>
+          </a:fontRef>
+        </p:style>
+        <p:txBody>
+          <a:bodyPr rtlCol="0" anchor="ctr"/>
+          <a:lstStyle/>
+          <a:p>
+            <a:pPr algn="ctr"/>
+            <a:r>
+              <a:rPr lang="en-US" sz="4400" dirty="0">
+                <a:latin typeface="Sakkal Majalla" panose="02000000000000000000" pitchFamily="2" charset="-78"/>
+                <a:cs typeface="Sakkal Majalla" panose="02000000000000000000" pitchFamily="2" charset="-78"/>
+              </a:rPr>
+              <a:t>Remote Project</a:t>
+            </a:r>
+          </a:p>
+        </p:txBody>
+      </p:sp>
+      <p:sp>
+        <p:nvSpPr>
+          <p:cNvPr id="52" name="Rectangle: Rounded Corners 51">
+            <a:extLst>
+              <a:ext uri="{FF2B5EF4-FFF2-40B4-BE49-F238E27FC236}">
+                <a16:creationId xmlns:a16="http://schemas.microsoft.com/office/drawing/2014/main" id="{B02E4217-F03A-2A06-71F7-2A1B02A02927}"/>
+              </a:ext>
+            </a:extLst>
+          </p:cNvPr>
+          <p:cNvSpPr/>
+          <p:nvPr/>
+        </p:nvSpPr>
+        <p:spPr>
+          <a:xfrm>
+            <a:off x="2487147" y="4731772"/>
+            <a:ext cx="1216609" cy="421893"/>
+          </a:xfrm>
+          <a:prstGeom prst="roundRect">
+            <a:avLst/>
+          </a:prstGeom>
+        </p:spPr>
+        <p:style>
+          <a:lnRef idx="2">
+            <a:schemeClr val="accent3">
+              <a:shade val="50000"/>
+            </a:schemeClr>
+          </a:lnRef>
+          <a:fillRef idx="1">
+            <a:schemeClr val="accent3"/>
+          </a:fillRef>
+          <a:effectRef idx="0">
+            <a:schemeClr val="accent3"/>
+          </a:effectRef>
+          <a:fontRef idx="minor">
+            <a:schemeClr val="lt1"/>
+          </a:fontRef>
+        </p:style>
+        <p:txBody>
+          <a:bodyPr rtlCol="0" anchor="ctr"/>
+          <a:lstStyle/>
+          <a:p>
+            <a:pPr algn="ctr"/>
+            <a:r>
+              <a:rPr lang="en-US" dirty="0">
+                <a:ln w="0"/>
+                <a:solidFill>
+                  <a:schemeClr val="tx1"/>
+                </a:solidFill>
+                <a:effectLst>
+                  <a:outerShdw blurRad="38100" dist="19050" dir="2700000" algn="tl" rotWithShape="0">
+                    <a:schemeClr val="dk1">
+                      <a:alpha val="40000"/>
+                    </a:schemeClr>
+                  </a:outerShdw>
+                </a:effectLst>
+                <a:latin typeface="Maiandra GD" panose="020E0502030308020204" pitchFamily="34" charset="0"/>
+              </a:rPr>
+              <a:t>Local 2</a:t>
+            </a:r>
+          </a:p>
+        </p:txBody>
+      </p:sp>
+      <p:sp>
+        <p:nvSpPr>
+          <p:cNvPr id="53" name="Rectangle: Rounded Corners 52">
+            <a:extLst>
+              <a:ext uri="{FF2B5EF4-FFF2-40B4-BE49-F238E27FC236}">
+                <a16:creationId xmlns:a16="http://schemas.microsoft.com/office/drawing/2014/main" id="{908E2AE2-3CED-5361-48C4-0C5132F9213C}"/>
+              </a:ext>
+            </a:extLst>
+          </p:cNvPr>
+          <p:cNvSpPr/>
+          <p:nvPr/>
+        </p:nvSpPr>
+        <p:spPr>
+          <a:xfrm>
+            <a:off x="2487146" y="5568725"/>
+            <a:ext cx="1216609" cy="421893"/>
+          </a:xfrm>
+          <a:prstGeom prst="roundRect">
+            <a:avLst/>
+          </a:prstGeom>
+        </p:spPr>
+        <p:style>
+          <a:lnRef idx="2">
+            <a:schemeClr val="accent3">
+              <a:shade val="50000"/>
+            </a:schemeClr>
+          </a:lnRef>
+          <a:fillRef idx="1">
+            <a:schemeClr val="accent3"/>
+          </a:fillRef>
+          <a:effectRef idx="0">
+            <a:schemeClr val="accent3"/>
+          </a:effectRef>
+          <a:fontRef idx="minor">
+            <a:schemeClr val="lt1"/>
+          </a:fontRef>
+        </p:style>
+        <p:txBody>
+          <a:bodyPr rtlCol="0" anchor="ctr"/>
+          <a:lstStyle/>
+          <a:p>
+            <a:pPr algn="ctr"/>
+            <a:r>
+              <a:rPr lang="en-US" dirty="0"/>
+              <a:t>Local 3</a:t>
+            </a:r>
+          </a:p>
+        </p:txBody>
+      </p:sp>
+      <p:sp>
+        <p:nvSpPr>
+          <p:cNvPr id="54" name="Rectangle: Rounded Corners 53">
+            <a:extLst>
+              <a:ext uri="{FF2B5EF4-FFF2-40B4-BE49-F238E27FC236}">
+                <a16:creationId xmlns:a16="http://schemas.microsoft.com/office/drawing/2014/main" id="{0CC3A061-5423-C4CE-770F-95482454E352}"/>
+              </a:ext>
+            </a:extLst>
+          </p:cNvPr>
+          <p:cNvSpPr/>
+          <p:nvPr/>
+        </p:nvSpPr>
+        <p:spPr>
+          <a:xfrm>
+            <a:off x="2487147" y="3894818"/>
+            <a:ext cx="1216609" cy="421893"/>
+          </a:xfrm>
+          <a:prstGeom prst="roundRect">
+            <a:avLst/>
+          </a:prstGeom>
+        </p:spPr>
+        <p:style>
+          <a:lnRef idx="2">
+            <a:schemeClr val="accent3">
+              <a:shade val="50000"/>
+            </a:schemeClr>
+          </a:lnRef>
+          <a:fillRef idx="1">
+            <a:schemeClr val="accent3"/>
+          </a:fillRef>
+          <a:effectRef idx="0">
+            <a:schemeClr val="accent3"/>
+          </a:effectRef>
+          <a:fontRef idx="minor">
+            <a:schemeClr val="lt1"/>
+          </a:fontRef>
+        </p:style>
+        <p:txBody>
+          <a:bodyPr rtlCol="0" anchor="ctr"/>
+          <a:lstStyle/>
+          <a:p>
+            <a:pPr algn="ctr"/>
+            <a:r>
+              <a:rPr lang="en-US" dirty="0">
+                <a:ln w="0"/>
+                <a:solidFill>
+                  <a:schemeClr val="tx1"/>
+                </a:solidFill>
+                <a:effectLst>
+                  <a:outerShdw blurRad="38100" dist="19050" dir="2700000" algn="tl" rotWithShape="0">
+                    <a:schemeClr val="dk1">
+                      <a:alpha val="40000"/>
+                    </a:schemeClr>
+                  </a:outerShdw>
+                </a:effectLst>
+                <a:latin typeface="Maiandra GD" panose="020E0502030308020204" pitchFamily="34" charset="0"/>
+              </a:rPr>
+              <a:t>Local 1</a:t>
+            </a:r>
+          </a:p>
+        </p:txBody>
+      </p:sp>
+      <p:cxnSp>
+        <p:nvCxnSpPr>
+          <p:cNvPr id="24" name="Connector: Curved 23">
+            <a:extLst>
+              <a:ext uri="{FF2B5EF4-FFF2-40B4-BE49-F238E27FC236}">
+                <a16:creationId xmlns:a16="http://schemas.microsoft.com/office/drawing/2014/main" id="{94E3461F-3834-ED45-FC4B-34C6D97B7CA9}"/>
+              </a:ext>
+            </a:extLst>
+          </p:cNvPr>
+          <p:cNvCxnSpPr>
+            <a:cxnSpLocks/>
+            <a:stCxn id="54" idx="0"/>
+            <a:endCxn id="51" idx="0"/>
+          </p:cNvCxnSpPr>
+          <p:nvPr/>
+        </p:nvCxnSpPr>
+        <p:spPr>
+          <a:xfrm rot="16200000" flipH="1">
+            <a:off x="5452695" y="1537575"/>
+            <a:ext cx="577890" cy="5292376"/>
+          </a:xfrm>
+          <a:prstGeom prst="curvedConnector3">
+            <a:avLst>
+              <a:gd name="adj1" fmla="val -39558"/>
+            </a:avLst>
+          </a:prstGeom>
+          <a:ln>
+            <a:solidFill>
+              <a:schemeClr val="tx1"/>
+            </a:solidFill>
+            <a:tailEnd type="triangle"/>
+          </a:ln>
+        </p:spPr>
+        <p:style>
+          <a:lnRef idx="1">
+            <a:schemeClr val="accent1"/>
+          </a:lnRef>
+          <a:fillRef idx="0">
+            <a:schemeClr val="accent1"/>
+          </a:fillRef>
+          <a:effectRef idx="0">
+            <a:schemeClr val="accent1"/>
+          </a:effectRef>
+          <a:fontRef idx="minor">
+            <a:schemeClr val="tx1"/>
+          </a:fontRef>
+        </p:style>
+      </p:cxnSp>
+      <p:cxnSp>
+        <p:nvCxnSpPr>
+          <p:cNvPr id="77" name="Connector: Curved 76">
+            <a:extLst>
+              <a:ext uri="{FF2B5EF4-FFF2-40B4-BE49-F238E27FC236}">
+                <a16:creationId xmlns:a16="http://schemas.microsoft.com/office/drawing/2014/main" id="{B5E4D133-477B-A390-D40E-5246A469146C}"/>
+              </a:ext>
+            </a:extLst>
+          </p:cNvPr>
+          <p:cNvCxnSpPr>
+            <a:cxnSpLocks/>
+            <a:stCxn id="51" idx="1"/>
+            <a:endCxn id="54" idx="3"/>
+          </p:cNvCxnSpPr>
+          <p:nvPr/>
+        </p:nvCxnSpPr>
+        <p:spPr>
+          <a:xfrm rot="10800000">
+            <a:off x="3703756" y="4105766"/>
+            <a:ext cx="2866726" cy="984223"/>
+          </a:xfrm>
+          <a:prstGeom prst="curvedConnector3">
+            <a:avLst>
+              <a:gd name="adj1" fmla="val 50000"/>
+            </a:avLst>
+          </a:prstGeom>
+          <a:ln>
+            <a:solidFill>
+              <a:schemeClr val="tx1"/>
+            </a:solidFill>
+            <a:tailEnd type="triangle"/>
+          </a:ln>
+        </p:spPr>
+        <p:style>
+          <a:lnRef idx="1">
+            <a:schemeClr val="accent1"/>
+          </a:lnRef>
+          <a:fillRef idx="0">
+            <a:schemeClr val="accent1"/>
+          </a:fillRef>
+          <a:effectRef idx="0">
+            <a:schemeClr val="accent1"/>
+          </a:effectRef>
+          <a:fontRef idx="minor">
+            <a:schemeClr val="tx1"/>
+          </a:fontRef>
+        </p:style>
+      </p:cxnSp>
+      <p:cxnSp>
+        <p:nvCxnSpPr>
+          <p:cNvPr id="80" name="Connector: Curved 79">
+            <a:extLst>
+              <a:ext uri="{FF2B5EF4-FFF2-40B4-BE49-F238E27FC236}">
+                <a16:creationId xmlns:a16="http://schemas.microsoft.com/office/drawing/2014/main" id="{77E442CA-C99D-BD22-0A21-A33D2364011D}"/>
+              </a:ext>
+            </a:extLst>
+          </p:cNvPr>
+          <p:cNvCxnSpPr>
+            <a:cxnSpLocks/>
+            <a:stCxn id="51" idx="1"/>
+            <a:endCxn id="52" idx="3"/>
+          </p:cNvCxnSpPr>
+          <p:nvPr/>
+        </p:nvCxnSpPr>
+        <p:spPr>
+          <a:xfrm rot="10800000">
+            <a:off x="3703756" y="4942720"/>
+            <a:ext cx="2866726" cy="147269"/>
+          </a:xfrm>
+          <a:prstGeom prst="curvedConnector3">
+            <a:avLst>
+              <a:gd name="adj1" fmla="val 50000"/>
+            </a:avLst>
+          </a:prstGeom>
+          <a:ln>
+            <a:solidFill>
+              <a:schemeClr val="tx1"/>
+            </a:solidFill>
+            <a:tailEnd type="triangle"/>
+          </a:ln>
+        </p:spPr>
+        <p:style>
+          <a:lnRef idx="1">
+            <a:schemeClr val="accent1"/>
+          </a:lnRef>
+          <a:fillRef idx="0">
+            <a:schemeClr val="accent1"/>
+          </a:fillRef>
+          <a:effectRef idx="0">
+            <a:schemeClr val="accent1"/>
+          </a:effectRef>
+          <a:fontRef idx="minor">
+            <a:schemeClr val="tx1"/>
+          </a:fontRef>
+        </p:style>
+      </p:cxnSp>
+      <p:cxnSp>
+        <p:nvCxnSpPr>
+          <p:cNvPr id="83" name="Connector: Curved 82">
+            <a:extLst>
+              <a:ext uri="{FF2B5EF4-FFF2-40B4-BE49-F238E27FC236}">
+                <a16:creationId xmlns:a16="http://schemas.microsoft.com/office/drawing/2014/main" id="{AA797705-577D-0762-438B-A864F28E2B65}"/>
+              </a:ext>
+            </a:extLst>
+          </p:cNvPr>
+          <p:cNvCxnSpPr>
+            <a:cxnSpLocks/>
+            <a:stCxn id="51" idx="1"/>
+            <a:endCxn id="53" idx="3"/>
+          </p:cNvCxnSpPr>
+          <p:nvPr/>
+        </p:nvCxnSpPr>
+        <p:spPr>
+          <a:xfrm rot="10800000" flipV="1">
+            <a:off x="3703756" y="5089988"/>
+            <a:ext cx="2866727" cy="689684"/>
+          </a:xfrm>
+          <a:prstGeom prst="curvedConnector3">
+            <a:avLst>
+              <a:gd name="adj1" fmla="val 50000"/>
+            </a:avLst>
+          </a:prstGeom>
+          <a:ln>
+            <a:solidFill>
+              <a:schemeClr val="tx1"/>
+            </a:solidFill>
+            <a:tailEnd type="triangle"/>
+          </a:ln>
+        </p:spPr>
+        <p:style>
+          <a:lnRef idx="1">
+            <a:schemeClr val="accent1"/>
+          </a:lnRef>
+          <a:fillRef idx="0">
+            <a:schemeClr val="accent1"/>
+          </a:fillRef>
+          <a:effectRef idx="0">
+            <a:schemeClr val="accent1"/>
+          </a:effectRef>
+          <a:fontRef idx="minor">
+            <a:schemeClr val="tx1"/>
+          </a:fontRef>
+        </p:style>
+      </p:cxnSp>
+      <p:cxnSp>
+        <p:nvCxnSpPr>
+          <p:cNvPr id="86" name="Connector: Curved 85">
+            <a:extLst>
+              <a:ext uri="{FF2B5EF4-FFF2-40B4-BE49-F238E27FC236}">
+                <a16:creationId xmlns:a16="http://schemas.microsoft.com/office/drawing/2014/main" id="{FECB9209-15F3-C21D-8247-1B2A7437C608}"/>
+              </a:ext>
+            </a:extLst>
+          </p:cNvPr>
+          <p:cNvCxnSpPr>
+            <a:cxnSpLocks/>
+            <a:stCxn id="53" idx="2"/>
+            <a:endCxn id="51" idx="2"/>
+          </p:cNvCxnSpPr>
+          <p:nvPr/>
+        </p:nvCxnSpPr>
+        <p:spPr>
+          <a:xfrm rot="5400000" flipH="1" flipV="1">
+            <a:off x="5599963" y="3202754"/>
+            <a:ext cx="283351" cy="5292377"/>
+          </a:xfrm>
+          <a:prstGeom prst="curvedConnector3">
+            <a:avLst>
+              <a:gd name="adj1" fmla="val -80677"/>
+            </a:avLst>
+          </a:prstGeom>
+          <a:ln>
+            <a:solidFill>
+              <a:schemeClr val="tx1"/>
+            </a:solidFill>
+            <a:tailEnd type="triangle"/>
+          </a:ln>
+        </p:spPr>
+        <p:style>
+          <a:lnRef idx="1">
+            <a:schemeClr val="accent1"/>
+          </a:lnRef>
+          <a:fillRef idx="0">
+            <a:schemeClr val="accent1"/>
+          </a:fillRef>
+          <a:effectRef idx="0">
+            <a:schemeClr val="accent1"/>
+          </a:effectRef>
+          <a:fontRef idx="minor">
+            <a:schemeClr val="tx1"/>
+          </a:fontRef>
+        </p:style>
+      </p:cxnSp>
+      <p:cxnSp>
+        <p:nvCxnSpPr>
+          <p:cNvPr id="89" name="Connector: Curved 88">
+            <a:extLst>
+              <a:ext uri="{FF2B5EF4-FFF2-40B4-BE49-F238E27FC236}">
+                <a16:creationId xmlns:a16="http://schemas.microsoft.com/office/drawing/2014/main" id="{7BDDB271-DBC2-C738-E6EC-F33C8186C50C}"/>
+              </a:ext>
+            </a:extLst>
+          </p:cNvPr>
+          <p:cNvCxnSpPr>
+            <a:cxnSpLocks/>
+            <a:stCxn id="52" idx="1"/>
+            <a:endCxn id="51" idx="3"/>
+          </p:cNvCxnSpPr>
+          <p:nvPr/>
+        </p:nvCxnSpPr>
+        <p:spPr>
+          <a:xfrm rot="10800000" flipH="1" flipV="1">
+            <a:off x="2487146" y="4942718"/>
+            <a:ext cx="7718027" cy="147269"/>
+          </a:xfrm>
+          <a:prstGeom prst="curvedConnector5">
+            <a:avLst>
+              <a:gd name="adj1" fmla="val -11650"/>
+              <a:gd name="adj2" fmla="val 1150403"/>
+              <a:gd name="adj3" fmla="val 105595"/>
+            </a:avLst>
+          </a:prstGeom>
+          <a:ln>
+            <a:solidFill>
+              <a:schemeClr val="tx1"/>
+            </a:solidFill>
+            <a:tailEnd type="triangle"/>
+          </a:ln>
+        </p:spPr>
+        <p:style>
+          <a:lnRef idx="1">
+            <a:schemeClr val="accent1"/>
+          </a:lnRef>
+          <a:fillRef idx="0">
+            <a:schemeClr val="accent1"/>
+          </a:fillRef>
+          <a:effectRef idx="0">
+            <a:schemeClr val="accent1"/>
+          </a:effectRef>
+          <a:fontRef idx="minor">
+            <a:schemeClr val="tx1"/>
+          </a:fontRef>
+        </p:style>
+      </p:cxnSp>
+      <p:sp>
+        <p:nvSpPr>
+          <p:cNvPr id="109" name="Rectangle: Rounded Corners 108">
+            <a:extLst>
+              <a:ext uri="{FF2B5EF4-FFF2-40B4-BE49-F238E27FC236}">
+                <a16:creationId xmlns:a16="http://schemas.microsoft.com/office/drawing/2014/main" id="{765E3419-00E2-25FD-7304-EA5CEA18ABCC}"/>
+              </a:ext>
+            </a:extLst>
+          </p:cNvPr>
+          <p:cNvSpPr/>
+          <p:nvPr/>
+        </p:nvSpPr>
+        <p:spPr>
+          <a:xfrm>
+            <a:off x="6875282" y="1728624"/>
+            <a:ext cx="3634692" cy="1234559"/>
+          </a:xfrm>
+          <a:prstGeom prst="roundRect">
+            <a:avLst/>
+          </a:prstGeom>
+        </p:spPr>
+        <p:style>
+          <a:lnRef idx="2">
+            <a:schemeClr val="accent5">
+              <a:shade val="50000"/>
+            </a:schemeClr>
+          </a:lnRef>
+          <a:fillRef idx="1">
+            <a:schemeClr val="accent5"/>
+          </a:fillRef>
+          <a:effectRef idx="0">
+            <a:schemeClr val="accent5"/>
+          </a:effectRef>
+          <a:fontRef idx="minor">
+            <a:schemeClr val="lt1"/>
+          </a:fontRef>
+        </p:style>
+        <p:txBody>
+          <a:bodyPr rtlCol="0" anchor="ctr"/>
+          <a:lstStyle/>
+          <a:p>
+            <a:pPr algn="ctr"/>
+            <a:r>
+              <a:rPr lang="en-US" sz="4400" dirty="0">
+                <a:latin typeface="Sakkal Majalla" panose="02000000000000000000" pitchFamily="2" charset="-78"/>
+                <a:cs typeface="Sakkal Majalla" panose="02000000000000000000" pitchFamily="2" charset="-78"/>
+              </a:rPr>
+              <a:t>Remote Project</a:t>
+            </a:r>
+          </a:p>
+        </p:txBody>
+      </p:sp>
+      <p:sp>
+        <p:nvSpPr>
+          <p:cNvPr id="110" name="Rectangle: Rounded Corners 109">
+            <a:extLst>
+              <a:ext uri="{FF2B5EF4-FFF2-40B4-BE49-F238E27FC236}">
+                <a16:creationId xmlns:a16="http://schemas.microsoft.com/office/drawing/2014/main" id="{B083C281-9581-F284-CF6B-C282FEC5E30C}"/>
+              </a:ext>
+            </a:extLst>
+          </p:cNvPr>
+          <p:cNvSpPr/>
+          <p:nvPr/>
+        </p:nvSpPr>
+        <p:spPr>
+          <a:xfrm>
+            <a:off x="2512981" y="2144409"/>
+            <a:ext cx="1216609" cy="421893"/>
+          </a:xfrm>
+          <a:prstGeom prst="roundRect">
+            <a:avLst/>
+          </a:prstGeom>
+        </p:spPr>
+        <p:style>
+          <a:lnRef idx="2">
+            <a:schemeClr val="accent3">
+              <a:shade val="50000"/>
+            </a:schemeClr>
+          </a:lnRef>
+          <a:fillRef idx="1">
+            <a:schemeClr val="accent3"/>
+          </a:fillRef>
+          <a:effectRef idx="0">
+            <a:schemeClr val="accent3"/>
+          </a:effectRef>
+          <a:fontRef idx="minor">
+            <a:schemeClr val="lt1"/>
+          </a:fontRef>
+        </p:style>
+        <p:txBody>
+          <a:bodyPr rtlCol="0" anchor="ctr"/>
+          <a:lstStyle/>
+          <a:p>
+            <a:pPr algn="ctr"/>
+            <a:r>
+              <a:rPr lang="en-US" dirty="0">
+                <a:ln w="0"/>
+                <a:solidFill>
+                  <a:schemeClr val="tx1"/>
+                </a:solidFill>
+                <a:effectLst>
+                  <a:outerShdw blurRad="38100" dist="19050" dir="2700000" algn="tl" rotWithShape="0">
+                    <a:schemeClr val="dk1">
+                      <a:alpha val="40000"/>
+                    </a:schemeClr>
+                  </a:outerShdw>
+                </a:effectLst>
+                <a:latin typeface="Maiandra GD" panose="020E0502030308020204" pitchFamily="34" charset="0"/>
+              </a:rPr>
+              <a:t>Local</a:t>
+            </a:r>
+          </a:p>
+        </p:txBody>
+      </p:sp>
+      <p:cxnSp>
+        <p:nvCxnSpPr>
+          <p:cNvPr id="111" name="Connector: Curved 110">
+            <a:extLst>
+              <a:ext uri="{FF2B5EF4-FFF2-40B4-BE49-F238E27FC236}">
+                <a16:creationId xmlns:a16="http://schemas.microsoft.com/office/drawing/2014/main" id="{4B96849E-56DB-19D8-B214-DC32384F4B32}"/>
+              </a:ext>
+            </a:extLst>
+          </p:cNvPr>
+          <p:cNvCxnSpPr>
+            <a:cxnSpLocks/>
+            <a:stCxn id="110" idx="0"/>
+            <a:endCxn id="109" idx="0"/>
+          </p:cNvCxnSpPr>
+          <p:nvPr/>
+        </p:nvCxnSpPr>
+        <p:spPr>
+          <a:xfrm rot="5400000" flipH="1" flipV="1">
+            <a:off x="5699065" y="-849154"/>
+            <a:ext cx="415785" cy="5571342"/>
+          </a:xfrm>
+          <a:prstGeom prst="curvedConnector3">
+            <a:avLst>
+              <a:gd name="adj1" fmla="val 154980"/>
+            </a:avLst>
+          </a:prstGeom>
+          <a:ln>
+            <a:solidFill>
+              <a:schemeClr val="tx1"/>
+            </a:solidFill>
+            <a:tailEnd type="triangle"/>
+          </a:ln>
+        </p:spPr>
+        <p:style>
+          <a:lnRef idx="1">
+            <a:schemeClr val="accent1"/>
+          </a:lnRef>
+          <a:fillRef idx="0">
+            <a:schemeClr val="accent1"/>
+          </a:fillRef>
+          <a:effectRef idx="0">
+            <a:schemeClr val="accent1"/>
+          </a:effectRef>
+          <a:fontRef idx="minor">
+            <a:schemeClr val="tx1"/>
+          </a:fontRef>
+        </p:style>
+      </p:cxnSp>
+      <p:cxnSp>
+        <p:nvCxnSpPr>
+          <p:cNvPr id="117" name="Connector: Curved 116">
+            <a:extLst>
+              <a:ext uri="{FF2B5EF4-FFF2-40B4-BE49-F238E27FC236}">
+                <a16:creationId xmlns:a16="http://schemas.microsoft.com/office/drawing/2014/main" id="{760BAB75-C105-7D9D-356D-6FC99A0C3E8B}"/>
+              </a:ext>
+            </a:extLst>
+          </p:cNvPr>
+          <p:cNvCxnSpPr>
+            <a:cxnSpLocks/>
+          </p:cNvCxnSpPr>
+          <p:nvPr/>
+        </p:nvCxnSpPr>
+        <p:spPr>
+          <a:xfrm rot="5400000" flipH="1">
+            <a:off x="5708517" y="-20928"/>
+            <a:ext cx="396881" cy="5571342"/>
+          </a:xfrm>
+          <a:prstGeom prst="curvedConnector3">
+            <a:avLst>
+              <a:gd name="adj1" fmla="val -57599"/>
+            </a:avLst>
+          </a:prstGeom>
+          <a:ln>
+            <a:solidFill>
+              <a:schemeClr val="tx1"/>
+            </a:solidFill>
+            <a:tailEnd type="triangle"/>
+          </a:ln>
+        </p:spPr>
+        <p:style>
+          <a:lnRef idx="1">
+            <a:schemeClr val="accent1"/>
+          </a:lnRef>
+          <a:fillRef idx="0">
+            <a:schemeClr val="accent1"/>
+          </a:fillRef>
+          <a:effectRef idx="0">
+            <a:schemeClr val="accent1"/>
+          </a:effectRef>
+          <a:fontRef idx="minor">
+            <a:schemeClr val="tx1"/>
+          </a:fontRef>
+        </p:style>
+      </p:cxnSp>
+      <p:sp>
+        <p:nvSpPr>
+          <p:cNvPr id="121" name="TextBox 120">
+            <a:extLst>
+              <a:ext uri="{FF2B5EF4-FFF2-40B4-BE49-F238E27FC236}">
+                <a16:creationId xmlns:a16="http://schemas.microsoft.com/office/drawing/2014/main" id="{A2B4EAF2-DF30-46BE-88EF-1F90E4BDC74B}"/>
+              </a:ext>
+            </a:extLst>
+          </p:cNvPr>
+          <p:cNvSpPr txBox="1"/>
+          <p:nvPr/>
+        </p:nvSpPr>
+        <p:spPr>
+          <a:xfrm>
+            <a:off x="4966576" y="1246722"/>
+            <a:ext cx="1880760" cy="307777"/>
+          </a:xfrm>
+          <a:prstGeom prst="rect">
+            <a:avLst/>
+          </a:prstGeom>
+          <a:noFill/>
+        </p:spPr>
+        <p:txBody>
+          <a:bodyPr wrap="square" rtlCol="0">
+            <a:spAutoFit/>
+          </a:bodyPr>
+          <a:lstStyle/>
+          <a:p>
+            <a:pPr algn="ctr"/>
+            <a:r>
+              <a:rPr lang="en-US" sz="1400" dirty="0">
+                <a:latin typeface="Segoe Print" panose="02000600000000000000" pitchFamily="2" charset="0"/>
+              </a:rPr>
+              <a:t>Push</a:t>
+            </a:r>
+          </a:p>
+        </p:txBody>
+      </p:sp>
+      <p:sp>
+        <p:nvSpPr>
+          <p:cNvPr id="123" name="TextBox 122">
+            <a:extLst>
+              <a:ext uri="{FF2B5EF4-FFF2-40B4-BE49-F238E27FC236}">
+                <a16:creationId xmlns:a16="http://schemas.microsoft.com/office/drawing/2014/main" id="{B2E9CB65-2E75-1776-59E8-6234331F2BDC}"/>
+              </a:ext>
+            </a:extLst>
+          </p:cNvPr>
+          <p:cNvSpPr txBox="1"/>
+          <p:nvPr/>
+        </p:nvSpPr>
+        <p:spPr>
+          <a:xfrm>
+            <a:off x="4384418" y="2914767"/>
+            <a:ext cx="3045076" cy="307777"/>
+          </a:xfrm>
+          <a:prstGeom prst="rect">
+            <a:avLst/>
+          </a:prstGeom>
+          <a:noFill/>
+        </p:spPr>
+        <p:txBody>
+          <a:bodyPr wrap="square" rtlCol="0">
+            <a:spAutoFit/>
+          </a:bodyPr>
+          <a:lstStyle/>
+          <a:p>
+            <a:pPr algn="ctr"/>
+            <a:r>
+              <a:rPr lang="en-US" sz="1400" dirty="0">
+                <a:latin typeface="Segoe Print" panose="02000600000000000000" pitchFamily="2" charset="0"/>
+              </a:rPr>
+              <a:t>Pull (Clone for first time)</a:t>
+            </a:r>
+          </a:p>
+        </p:txBody>
+      </p:sp>
+    </p:spTree>
+    <p:extLst>
+      <p:ext uri="{BB962C8B-B14F-4D97-AF65-F5344CB8AC3E}">
+        <p14:creationId xmlns:p14="http://schemas.microsoft.com/office/powerpoint/2010/main" val="3102191338"/>
+      </p:ext>
+    </p:extLst>
+  </p:cSld>
+  <p:clrMapOvr>
+    <a:masterClrMapping/>
+  </p:clrMapOvr>
+</p:sld>
+</file>
+
+<file path=ppt/slides/slide5.xml><?xml version="1.0" encoding="utf-8"?>
+<p:sld xmlns:a="http://schemas.openxmlformats.org/drawingml/2006/main" xmlns:r="http://schemas.openxmlformats.org/officeDocument/2006/relationships" xmlns:p="http://schemas.openxmlformats.org/presentationml/2006/main">
+  <p:cSld>
+    <p:spTree>
+      <p:nvGrpSpPr>
+        <p:cNvPr id="1" name=""/>
+        <p:cNvGrpSpPr/>
+        <p:nvPr/>
+      </p:nvGrpSpPr>
+      <p:grpSpPr>
+        <a:xfrm>
+          <a:off x="0" y="0"/>
+          <a:ext cx="0" cy="0"/>
+          <a:chOff x="0" y="0"/>
+          <a:chExt cx="0" cy="0"/>
+        </a:xfrm>
+      </p:grpSpPr>
+      <p:sp>
+        <p:nvSpPr>
+          <p:cNvPr id="2" name="Rectangle: Rounded Corners 1">
+            <a:extLst>
+              <a:ext uri="{FF2B5EF4-FFF2-40B4-BE49-F238E27FC236}">
+                <a16:creationId xmlns:a16="http://schemas.microsoft.com/office/drawing/2014/main" id="{FF047C5A-CC8D-4C02-8907-80366B8D93CD}"/>
+              </a:ext>
+            </a:extLst>
+          </p:cNvPr>
+          <p:cNvSpPr/>
+          <p:nvPr/>
+        </p:nvSpPr>
+        <p:spPr>
+          <a:xfrm>
+            <a:off x="-1" y="0"/>
+            <a:ext cx="6570483" cy="1033669"/>
+          </a:xfrm>
+          <a:prstGeom prst="roundRect">
+            <a:avLst/>
+          </a:prstGeom>
+          <a:solidFill>
+            <a:schemeClr val="accent3">
+              <a:alpha val="50000"/>
+            </a:schemeClr>
+          </a:solidFill>
+          <a:ln>
+            <a:noFill/>
+          </a:ln>
+        </p:spPr>
+        <p:style>
+          <a:lnRef idx="0">
+            <a:scrgbClr r="0" g="0" b="0"/>
+          </a:lnRef>
+          <a:fillRef idx="0">
+            <a:scrgbClr r="0" g="0" b="0"/>
+          </a:fillRef>
+          <a:effectRef idx="0">
+            <a:scrgbClr r="0" g="0" b="0"/>
+          </a:effectRef>
+          <a:fontRef idx="minor">
+            <a:schemeClr val="lt1"/>
+          </a:fontRef>
+        </p:style>
+        <p:txBody>
+          <a:bodyPr rtlCol="0" anchor="ctr"/>
+          <a:lstStyle/>
+          <a:p>
+            <a:pPr algn="ctr"/>
+            <a:r>
+              <a:rPr lang="en-US" sz="3600" dirty="0">
+                <a:ln w="0"/>
+                <a:solidFill>
+                  <a:srgbClr val="FFFF00"/>
+                </a:solidFill>
+                <a:effectLst>
+                  <a:outerShdw blurRad="38100" dist="19050" dir="2700000" algn="tl" rotWithShape="0">
+                    <a:schemeClr val="dk1">
+                      <a:alpha val="40000"/>
+                    </a:schemeClr>
+                  </a:outerShdw>
+                </a:effectLst>
+                <a:latin typeface="Poor Richard" panose="02080502050505020702" pitchFamily="18" charset="0"/>
+              </a:rPr>
+              <a:t>Git Notes(Remote)</a:t>
+            </a:r>
+          </a:p>
+        </p:txBody>
+      </p:sp>
+      <p:sp>
+        <p:nvSpPr>
+          <p:cNvPr id="20" name="Rectangle: Rounded Corners 19">
+            <a:extLst>
+              <a:ext uri="{FF2B5EF4-FFF2-40B4-BE49-F238E27FC236}">
+                <a16:creationId xmlns:a16="http://schemas.microsoft.com/office/drawing/2014/main" id="{2A051D2A-FC0C-D9B7-2F12-C934D614E41A}"/>
               </a:ext>
             </a:extLst>
           </p:cNvPr>
@@ -6849,11 +9373,14 @@
                 </a:effectLst>
                 <a:latin typeface="Poor Richard" panose="02080502050505020702" pitchFamily="18" charset="0"/>
               </a:rPr>
-              <a:t>Comparing two Branches:</a:t>
-            </a:r>
-          </a:p>
-          <a:p>
-            <a:pPr lvl="1" algn="just"/>
+              <a:t>Every local have specific contributor.</a:t>
+            </a:r>
+          </a:p>
+          <a:p>
+            <a:pPr marL="457200" indent="-457200" algn="just">
+              <a:buFont typeface="Arial" panose="020B0604020202020204" pitchFamily="34" charset="0"/>
+              <a:buChar char="•"/>
+            </a:pPr>
             <a:r>
               <a:rPr lang="en-US" sz="3200" dirty="0">
                 <a:ln w="0"/>
@@ -6869,11 +9396,14 @@
                 </a:effectLst>
                 <a:latin typeface="Poor Richard" panose="02080502050505020702" pitchFamily="18" charset="0"/>
               </a:rPr>
-              <a:t>	Go to Address:</a:t>
-            </a:r>
-          </a:p>
-          <a:p>
-            <a:pPr lvl="1" algn="just"/>
+              <a:t>Contributors can have some branches just for themselves and don’t push that branch. But every contributor can have one master or main branch that certainly is on remote and on local.</a:t>
+            </a:r>
+          </a:p>
+          <a:p>
+            <a:pPr marL="457200" indent="-457200" algn="just">
+              <a:buFont typeface="Arial" panose="020B0604020202020204" pitchFamily="34" charset="0"/>
+              <a:buChar char="•"/>
+            </a:pPr>
             <a:r>
               <a:rPr lang="en-US" sz="3200" dirty="0">
                 <a:ln w="0"/>
@@ -6889,16 +9419,10 @@
                 </a:effectLst>
                 <a:latin typeface="Poor Richard" panose="02080502050505020702" pitchFamily="18" charset="0"/>
               </a:rPr>
-              <a:t>		 github.com/&lt;user-name&gt;/&lt;repo-name&gt;/compare/ </a:t>
-            </a:r>
-          </a:p>
-          <a:p>
-            <a:pPr marL="457200" indent="-457200" algn="just">
-              <a:buFont typeface="Arial" panose="020B0604020202020204" pitchFamily="34" charset="0"/>
-              <a:buChar char="•"/>
-            </a:pPr>
-            <a:r>
-              <a:rPr lang="en-US" sz="3200" dirty="0">
+              <a:t>In First Starter contributor make repository and make “git </a:t>
+            </a:r>
+            <a:r>
+              <a:rPr lang="en-US" sz="3200" dirty="0" err="1">
                 <a:ln w="0"/>
                 <a:solidFill>
                   <a:schemeClr val="tx1"/>
@@ -6912,11 +9436,8 @@
                 </a:effectLst>
                 <a:latin typeface="Poor Richard" panose="02080502050505020702" pitchFamily="18" charset="0"/>
               </a:rPr>
-              <a:t>Comparing two Commits:</a:t>
-            </a:r>
-          </a:p>
-          <a:p>
-            <a:pPr lvl="2" algn="just"/>
+              <a:t>init</a:t>
+            </a:r>
             <a:r>
               <a:rPr lang="en-US" sz="3200" dirty="0">
                 <a:ln w="0"/>
@@ -6932,13 +9453,16 @@
                 </a:effectLst>
                 <a:latin typeface="Poor Richard" panose="02080502050505020702" pitchFamily="18" charset="0"/>
               </a:rPr>
-              <a:t>Go to Address:</a:t>
-            </a:r>
-          </a:p>
-          <a:p>
-            <a:pPr lvl="2" algn="just"/>
-            <a:r>
-              <a:rPr lang="en-US" sz="2400" dirty="0">
+              <a:t>” and add first files and push to the remote project.</a:t>
+            </a:r>
+          </a:p>
+          <a:p>
+            <a:pPr marL="457200" indent="-457200" algn="just">
+              <a:buFont typeface="Arial" panose="020B0604020202020204" pitchFamily="34" charset="0"/>
+              <a:buChar char="•"/>
+            </a:pPr>
+            <a:r>
+              <a:rPr lang="en-US" sz="3200" dirty="0">
                 <a:ln w="0"/>
                 <a:solidFill>
                   <a:schemeClr val="tx1"/>
@@ -6952,10 +9476,10 @@
                 </a:effectLst>
                 <a:latin typeface="Poor Richard" panose="02080502050505020702" pitchFamily="18" charset="0"/>
               </a:rPr>
-              <a:t> 	</a:t>
-            </a:r>
-            <a:r>
-              <a:rPr lang="en-US" sz="2000" dirty="0">
+              <a:t>For first time that one contributor has not </a:t>
+            </a:r>
+            <a:r>
+              <a:rPr lang="en-US" sz="3200" dirty="0" err="1">
                 <a:ln w="0"/>
                 <a:solidFill>
                   <a:schemeClr val="tx1"/>
@@ -6969,9 +9493,26 @@
                 </a:effectLst>
                 <a:latin typeface="Poor Richard" panose="02080502050505020702" pitchFamily="18" charset="0"/>
               </a:rPr>
-              <a:t>github.com/&lt;user-name&gt;/&lt;repo-name&gt;/compare/&lt;commit1 Address&gt;…&lt;commit2Address&gt;</a:t>
-            </a:r>
-            <a:endParaRPr lang="en-US" sz="3200" dirty="0">
+              <a:t>exsisting</a:t>
+            </a:r>
+            <a:r>
+              <a:rPr lang="en-US" sz="3200" dirty="0">
+                <a:ln w="0"/>
+                <a:solidFill>
+                  <a:schemeClr val="tx1"/>
+                </a:solidFill>
+                <a:effectLst>
+                  <a:outerShdw blurRad="38100" dist="19050" dir="2700000" algn="tl" rotWithShape="0">
+                    <a:schemeClr val="dk1">
+                      <a:alpha val="40000"/>
+                    </a:schemeClr>
+                  </a:outerShdw>
+                </a:effectLst>
+                <a:latin typeface="Poor Richard" panose="02080502050505020702" pitchFamily="18" charset="0"/>
+              </a:rPr>
+              <a:t> project, he should make “git clone” the project to his local system.</a:t>
+            </a:r>
+            <a:endParaRPr lang="en-US" sz="2000" dirty="0">
               <a:ln w="0"/>
               <a:solidFill>
                 <a:schemeClr val="tx1"/>
@@ -6985,6 +9526,219 @@
               </a:effectLst>
               <a:latin typeface="Poor Richard" panose="02080502050505020702" pitchFamily="18" charset="0"/>
             </a:endParaRPr>
+          </a:p>
+        </p:txBody>
+      </p:sp>
+    </p:spTree>
+    <p:extLst>
+      <p:ext uri="{BB962C8B-B14F-4D97-AF65-F5344CB8AC3E}">
+        <p14:creationId xmlns:p14="http://schemas.microsoft.com/office/powerpoint/2010/main" val="3167469246"/>
+      </p:ext>
+    </p:extLst>
+  </p:cSld>
+  <p:clrMapOvr>
+    <a:masterClrMapping/>
+  </p:clrMapOvr>
+</p:sld>
+</file>
+
+<file path=ppt/slides/slide6.xml><?xml version="1.0" encoding="utf-8"?>
+<p:sld xmlns:a="http://schemas.openxmlformats.org/drawingml/2006/main" xmlns:r="http://schemas.openxmlformats.org/officeDocument/2006/relationships" xmlns:p="http://schemas.openxmlformats.org/presentationml/2006/main">
+  <p:cSld>
+    <p:spTree>
+      <p:nvGrpSpPr>
+        <p:cNvPr id="1" name=""/>
+        <p:cNvGrpSpPr/>
+        <p:nvPr/>
+      </p:nvGrpSpPr>
+      <p:grpSpPr>
+        <a:xfrm>
+          <a:off x="0" y="0"/>
+          <a:ext cx="0" cy="0"/>
+          <a:chOff x="0" y="0"/>
+          <a:chExt cx="0" cy="0"/>
+        </a:xfrm>
+      </p:grpSpPr>
+      <p:sp>
+        <p:nvSpPr>
+          <p:cNvPr id="2" name="Rectangle: Rounded Corners 1">
+            <a:extLst>
+              <a:ext uri="{FF2B5EF4-FFF2-40B4-BE49-F238E27FC236}">
+                <a16:creationId xmlns:a16="http://schemas.microsoft.com/office/drawing/2014/main" id="{FF047C5A-CC8D-4C02-8907-80366B8D93CD}"/>
+              </a:ext>
+            </a:extLst>
+          </p:cNvPr>
+          <p:cNvSpPr/>
+          <p:nvPr/>
+        </p:nvSpPr>
+        <p:spPr>
+          <a:xfrm>
+            <a:off x="-1" y="0"/>
+            <a:ext cx="6570483" cy="1033669"/>
+          </a:xfrm>
+          <a:prstGeom prst="roundRect">
+            <a:avLst/>
+          </a:prstGeom>
+          <a:solidFill>
+            <a:schemeClr val="accent3">
+              <a:alpha val="50000"/>
+            </a:schemeClr>
+          </a:solidFill>
+          <a:ln>
+            <a:noFill/>
+          </a:ln>
+        </p:spPr>
+        <p:style>
+          <a:lnRef idx="0">
+            <a:scrgbClr r="0" g="0" b="0"/>
+          </a:lnRef>
+          <a:fillRef idx="0">
+            <a:scrgbClr r="0" g="0" b="0"/>
+          </a:fillRef>
+          <a:effectRef idx="0">
+            <a:scrgbClr r="0" g="0" b="0"/>
+          </a:effectRef>
+          <a:fontRef idx="minor">
+            <a:schemeClr val="lt1"/>
+          </a:fontRef>
+        </p:style>
+        <p:txBody>
+          <a:bodyPr rtlCol="0" anchor="ctr"/>
+          <a:lstStyle/>
+          <a:p>
+            <a:pPr algn="ctr"/>
+            <a:r>
+              <a:rPr lang="en-US" sz="3600" dirty="0">
+                <a:ln w="0"/>
+                <a:solidFill>
+                  <a:srgbClr val="FFFF00"/>
+                </a:solidFill>
+                <a:effectLst>
+                  <a:outerShdw blurRad="38100" dist="19050" dir="2700000" algn="tl" rotWithShape="0">
+                    <a:schemeClr val="dk1">
+                      <a:alpha val="40000"/>
+                    </a:schemeClr>
+                  </a:outerShdw>
+                </a:effectLst>
+                <a:latin typeface="Poor Richard" panose="02080502050505020702" pitchFamily="18" charset="0"/>
+              </a:rPr>
+              <a:t>Search bar Github.com</a:t>
+            </a:r>
+          </a:p>
+        </p:txBody>
+      </p:sp>
+      <p:sp>
+        <p:nvSpPr>
+          <p:cNvPr id="3" name="Rectangle: Rounded Corners 2">
+            <a:extLst>
+              <a:ext uri="{FF2B5EF4-FFF2-40B4-BE49-F238E27FC236}">
+                <a16:creationId xmlns:a16="http://schemas.microsoft.com/office/drawing/2014/main" id="{EA2FC01D-16C5-48D7-8B7C-B82949EA46C4}"/>
+              </a:ext>
+            </a:extLst>
+          </p:cNvPr>
+          <p:cNvSpPr/>
+          <p:nvPr/>
+        </p:nvSpPr>
+        <p:spPr>
+          <a:xfrm>
+            <a:off x="0" y="1033669"/>
+            <a:ext cx="12192000" cy="5824332"/>
+          </a:xfrm>
+          <a:prstGeom prst="roundRect">
+            <a:avLst>
+              <a:gd name="adj" fmla="val 15461"/>
+            </a:avLst>
+          </a:prstGeom>
+          <a:noFill/>
+          <a:ln>
+            <a:noFill/>
+          </a:ln>
+        </p:spPr>
+        <p:style>
+          <a:lnRef idx="0">
+            <a:scrgbClr r="0" g="0" b="0"/>
+          </a:lnRef>
+          <a:fillRef idx="0">
+            <a:scrgbClr r="0" g="0" b="0"/>
+          </a:fillRef>
+          <a:effectRef idx="0">
+            <a:scrgbClr r="0" g="0" b="0"/>
+          </a:effectRef>
+          <a:fontRef idx="minor">
+            <a:schemeClr val="accent5"/>
+          </a:fontRef>
+        </p:style>
+        <p:txBody>
+          <a:bodyPr rtlCol="0" anchor="ctr"/>
+          <a:lstStyle/>
+          <a:p>
+            <a:pPr marL="457200" indent="-457200" algn="just">
+              <a:buFont typeface="Arial" panose="020B0604020202020204" pitchFamily="34" charset="0"/>
+              <a:buChar char="•"/>
+            </a:pPr>
+            <a:r>
+              <a:rPr lang="en-US" sz="3200" dirty="0">
+                <a:ln w="0"/>
+                <a:solidFill>
+                  <a:schemeClr val="tx1"/>
+                </a:solidFill>
+                <a:effectLst>
+                  <a:outerShdw blurRad="38100" dist="19050" dir="2700000" algn="tl" rotWithShape="0">
+                    <a:schemeClr val="dk1">
+                      <a:alpha val="40000"/>
+                    </a:schemeClr>
+                  </a:outerShdw>
+                </a:effectLst>
+                <a:latin typeface="Poor Richard" panose="02080502050505020702" pitchFamily="18" charset="0"/>
+              </a:rPr>
+              <a:t>Search bar in github.com can be very useful. It search the word inputted word in scope that you are now for example if you are in the specific repository it search inputted word in that repository and you search in first page of github.com it search the word in all of repository in the world!</a:t>
+            </a:r>
+          </a:p>
+          <a:p>
+            <a:pPr marL="457200" indent="-457200" algn="just">
+              <a:buFont typeface="Arial" panose="020B0604020202020204" pitchFamily="34" charset="0"/>
+              <a:buChar char="•"/>
+            </a:pPr>
+            <a:r>
+              <a:rPr lang="en-US" sz="3200" dirty="0">
+                <a:ln w="0"/>
+                <a:solidFill>
+                  <a:schemeClr val="tx1"/>
+                </a:solidFill>
+                <a:effectLst>
+                  <a:outerShdw blurRad="38100" dist="19050" dir="2700000" algn="tl" rotWithShape="0">
+                    <a:schemeClr val="dk1">
+                      <a:alpha val="40000"/>
+                    </a:schemeClr>
+                  </a:outerShdw>
+                </a:effectLst>
+                <a:latin typeface="Poor Richard" panose="02080502050505020702" pitchFamily="18" charset="0"/>
+              </a:rPr>
+              <a:t>After search you can find your searched word in Codes, Commits, Issues, Discussions, Packages and Wikis.</a:t>
+            </a:r>
+          </a:p>
+          <a:p>
+            <a:pPr marL="457200" indent="-457200" algn="just">
+              <a:buFont typeface="Arial" panose="020B0604020202020204" pitchFamily="34" charset="0"/>
+              <a:buChar char="•"/>
+            </a:pPr>
+            <a:r>
+              <a:rPr lang="en-US" sz="3200" dirty="0">
+                <a:ln w="0"/>
+                <a:solidFill>
+                  <a:schemeClr val="tx1"/>
+                </a:solidFill>
+                <a:effectLst>
+                  <a:outerShdw blurRad="38100" dist="19050" dir="2700000" algn="tl" rotWithShape="0">
+                    <a:schemeClr val="dk1">
+                      <a:alpha val="40000"/>
+                    </a:schemeClr>
+                  </a:outerShdw>
+                </a:effectLst>
+                <a:latin typeface="Poor Richard" panose="02080502050505020702" pitchFamily="18" charset="0"/>
+              </a:rPr>
+              <a:t>You can see the programming languages that use from the inputted word.</a:t>
+            </a:r>
           </a:p>
           <a:p>
             <a:pPr algn="just"/>
@@ -7008,7 +9762,672 @@
     </p:spTree>
     <p:extLst>
       <p:ext uri="{BB962C8B-B14F-4D97-AF65-F5344CB8AC3E}">
+        <p14:creationId xmlns:p14="http://schemas.microsoft.com/office/powerpoint/2010/main" val="2002756075"/>
+      </p:ext>
+    </p:extLst>
+  </p:cSld>
+  <p:clrMapOvr>
+    <a:masterClrMapping/>
+  </p:clrMapOvr>
+</p:sld>
+</file>
+
+<file path=ppt/slides/slide7.xml><?xml version="1.0" encoding="utf-8"?>
+<p:sld xmlns:a="http://schemas.openxmlformats.org/drawingml/2006/main" xmlns:r="http://schemas.openxmlformats.org/officeDocument/2006/relationships" xmlns:p="http://schemas.openxmlformats.org/presentationml/2006/main">
+  <p:cSld>
+    <p:spTree>
+      <p:nvGrpSpPr>
+        <p:cNvPr id="1" name=""/>
+        <p:cNvGrpSpPr/>
+        <p:nvPr/>
+      </p:nvGrpSpPr>
+      <p:grpSpPr>
+        <a:xfrm>
+          <a:off x="0" y="0"/>
+          <a:ext cx="0" cy="0"/>
+          <a:chOff x="0" y="0"/>
+          <a:chExt cx="0" cy="0"/>
+        </a:xfrm>
+      </p:grpSpPr>
+      <p:sp>
+        <p:nvSpPr>
+          <p:cNvPr id="2" name="Rectangle: Rounded Corners 1">
+            <a:extLst>
+              <a:ext uri="{FF2B5EF4-FFF2-40B4-BE49-F238E27FC236}">
+                <a16:creationId xmlns:a16="http://schemas.microsoft.com/office/drawing/2014/main" id="{FF047C5A-CC8D-4C02-8907-80366B8D93CD}"/>
+              </a:ext>
+            </a:extLst>
+          </p:cNvPr>
+          <p:cNvSpPr/>
+          <p:nvPr/>
+        </p:nvSpPr>
+        <p:spPr>
+          <a:xfrm>
+            <a:off x="-1" y="0"/>
+            <a:ext cx="6570483" cy="1033669"/>
+          </a:xfrm>
+          <a:prstGeom prst="roundRect">
+            <a:avLst/>
+          </a:prstGeom>
+          <a:solidFill>
+            <a:schemeClr val="accent3">
+              <a:alpha val="50000"/>
+            </a:schemeClr>
+          </a:solidFill>
+          <a:ln>
+            <a:noFill/>
+          </a:ln>
+        </p:spPr>
+        <p:style>
+          <a:lnRef idx="0">
+            <a:scrgbClr r="0" g="0" b="0"/>
+          </a:lnRef>
+          <a:fillRef idx="0">
+            <a:scrgbClr r="0" g="0" b="0"/>
+          </a:fillRef>
+          <a:effectRef idx="0">
+            <a:scrgbClr r="0" g="0" b="0"/>
+          </a:effectRef>
+          <a:fontRef idx="minor">
+            <a:schemeClr val="lt1"/>
+          </a:fontRef>
+        </p:style>
+        <p:txBody>
+          <a:bodyPr rtlCol="0" anchor="ctr"/>
+          <a:lstStyle/>
+          <a:p>
+            <a:pPr algn="ctr"/>
+            <a:r>
+              <a:rPr lang="en-US" sz="3600" dirty="0">
+                <a:ln w="0"/>
+                <a:solidFill>
+                  <a:srgbClr val="FFFF00"/>
+                </a:solidFill>
+                <a:effectLst>
+                  <a:outerShdw blurRad="38100" dist="19050" dir="2700000" algn="tl" rotWithShape="0">
+                    <a:schemeClr val="dk1">
+                      <a:alpha val="40000"/>
+                    </a:schemeClr>
+                  </a:outerShdw>
+                </a:effectLst>
+                <a:latin typeface="Poor Richard" panose="02080502050505020702" pitchFamily="18" charset="0"/>
+              </a:rPr>
+              <a:t>Comparing codes</a:t>
+            </a:r>
+          </a:p>
+        </p:txBody>
+      </p:sp>
+      <p:sp>
+        <p:nvSpPr>
+          <p:cNvPr id="3" name="Rectangle: Rounded Corners 2">
+            <a:extLst>
+              <a:ext uri="{FF2B5EF4-FFF2-40B4-BE49-F238E27FC236}">
+                <a16:creationId xmlns:a16="http://schemas.microsoft.com/office/drawing/2014/main" id="{EA2FC01D-16C5-48D7-8B7C-B82949EA46C4}"/>
+              </a:ext>
+            </a:extLst>
+          </p:cNvPr>
+          <p:cNvSpPr/>
+          <p:nvPr/>
+        </p:nvSpPr>
+        <p:spPr>
+          <a:xfrm>
+            <a:off x="0" y="1033669"/>
+            <a:ext cx="12192000" cy="5824332"/>
+          </a:xfrm>
+          <a:prstGeom prst="roundRect">
+            <a:avLst>
+              <a:gd name="adj" fmla="val 15461"/>
+            </a:avLst>
+          </a:prstGeom>
+          <a:noFill/>
+          <a:ln>
+            <a:noFill/>
+          </a:ln>
+        </p:spPr>
+        <p:style>
+          <a:lnRef idx="0">
+            <a:scrgbClr r="0" g="0" b="0"/>
+          </a:lnRef>
+          <a:fillRef idx="0">
+            <a:scrgbClr r="0" g="0" b="0"/>
+          </a:fillRef>
+          <a:effectRef idx="0">
+            <a:scrgbClr r="0" g="0" b="0"/>
+          </a:effectRef>
+          <a:fontRef idx="minor">
+            <a:schemeClr val="accent5"/>
+          </a:fontRef>
+        </p:style>
+        <p:txBody>
+          <a:bodyPr rtlCol="0" anchor="ctr"/>
+          <a:lstStyle/>
+          <a:p>
+            <a:pPr marL="457200" indent="-457200" algn="just">
+              <a:buFont typeface="Arial" panose="020B0604020202020204" pitchFamily="34" charset="0"/>
+              <a:buChar char="•"/>
+            </a:pPr>
+            <a:r>
+              <a:rPr lang="en-US" sz="3200" dirty="0">
+                <a:ln w="0"/>
+                <a:solidFill>
+                  <a:schemeClr val="tx1"/>
+                </a:solidFill>
+                <a:effectLst>
+                  <a:outerShdw blurRad="38100" dist="19050" dir="2700000" algn="tl" rotWithShape="0">
+                    <a:schemeClr val="dk1">
+                      <a:alpha val="40000"/>
+                    </a:schemeClr>
+                  </a:outerShdw>
+                </a:effectLst>
+                <a:latin typeface="Poor Richard" panose="02080502050505020702" pitchFamily="18" charset="0"/>
+              </a:rPr>
+              <a:t>Comparing two Branches:</a:t>
+            </a:r>
+          </a:p>
+          <a:p>
+            <a:pPr lvl="1" algn="just"/>
+            <a:r>
+              <a:rPr lang="en-US" sz="3200" dirty="0">
+                <a:ln w="0"/>
+                <a:solidFill>
+                  <a:schemeClr val="tx1"/>
+                </a:solidFill>
+                <a:effectLst>
+                  <a:outerShdw blurRad="38100" dist="19050" dir="2700000" algn="tl" rotWithShape="0">
+                    <a:schemeClr val="dk1">
+                      <a:alpha val="40000"/>
+                    </a:schemeClr>
+                  </a:outerShdw>
+                </a:effectLst>
+                <a:latin typeface="Poor Richard" panose="02080502050505020702" pitchFamily="18" charset="0"/>
+              </a:rPr>
+              <a:t>	Go to Address:</a:t>
+            </a:r>
+          </a:p>
+          <a:p>
+            <a:pPr lvl="1" algn="just"/>
+            <a:r>
+              <a:rPr lang="en-US" sz="3200" dirty="0">
+                <a:ln w="0"/>
+                <a:solidFill>
+                  <a:schemeClr val="tx1"/>
+                </a:solidFill>
+                <a:effectLst>
+                  <a:outerShdw blurRad="38100" dist="19050" dir="2700000" algn="tl" rotWithShape="0">
+                    <a:schemeClr val="dk1">
+                      <a:alpha val="40000"/>
+                    </a:schemeClr>
+                  </a:outerShdw>
+                </a:effectLst>
+                <a:latin typeface="Poor Richard" panose="02080502050505020702" pitchFamily="18" charset="0"/>
+              </a:rPr>
+              <a:t>		 github.com/&lt;user-name&gt;/&lt;repo-name&gt;/compare/ </a:t>
+            </a:r>
+          </a:p>
+          <a:p>
+            <a:pPr marL="457200" indent="-457200" algn="just">
+              <a:buFont typeface="Arial" panose="020B0604020202020204" pitchFamily="34" charset="0"/>
+              <a:buChar char="•"/>
+            </a:pPr>
+            <a:r>
+              <a:rPr lang="en-US" sz="3200" dirty="0">
+                <a:ln w="0"/>
+                <a:solidFill>
+                  <a:schemeClr val="tx1"/>
+                </a:solidFill>
+                <a:effectLst>
+                  <a:outerShdw blurRad="38100" dist="19050" dir="2700000" algn="tl" rotWithShape="0">
+                    <a:schemeClr val="dk1">
+                      <a:alpha val="40000"/>
+                    </a:schemeClr>
+                  </a:outerShdw>
+                </a:effectLst>
+                <a:latin typeface="Poor Richard" panose="02080502050505020702" pitchFamily="18" charset="0"/>
+              </a:rPr>
+              <a:t>Comparing two Commits:</a:t>
+            </a:r>
+          </a:p>
+          <a:p>
+            <a:pPr lvl="2" algn="just"/>
+            <a:r>
+              <a:rPr lang="en-US" sz="3200" dirty="0">
+                <a:ln w="0"/>
+                <a:solidFill>
+                  <a:schemeClr val="tx1"/>
+                </a:solidFill>
+                <a:effectLst>
+                  <a:outerShdw blurRad="38100" dist="19050" dir="2700000" algn="tl" rotWithShape="0">
+                    <a:schemeClr val="dk1">
+                      <a:alpha val="40000"/>
+                    </a:schemeClr>
+                  </a:outerShdw>
+                </a:effectLst>
+                <a:latin typeface="Poor Richard" panose="02080502050505020702" pitchFamily="18" charset="0"/>
+              </a:rPr>
+              <a:t>Go to Address:</a:t>
+            </a:r>
+          </a:p>
+          <a:p>
+            <a:pPr lvl="2" algn="just"/>
+            <a:r>
+              <a:rPr lang="en-US" sz="2400" dirty="0">
+                <a:ln w="0"/>
+                <a:solidFill>
+                  <a:schemeClr val="tx1"/>
+                </a:solidFill>
+                <a:effectLst>
+                  <a:outerShdw blurRad="38100" dist="19050" dir="2700000" algn="tl" rotWithShape="0">
+                    <a:schemeClr val="dk1">
+                      <a:alpha val="40000"/>
+                    </a:schemeClr>
+                  </a:outerShdw>
+                </a:effectLst>
+                <a:latin typeface="Poor Richard" panose="02080502050505020702" pitchFamily="18" charset="0"/>
+              </a:rPr>
+              <a:t> 	</a:t>
+            </a:r>
+            <a:r>
+              <a:rPr lang="en-US" sz="2000" dirty="0">
+                <a:ln w="0"/>
+                <a:solidFill>
+                  <a:schemeClr val="tx1"/>
+                </a:solidFill>
+                <a:effectLst>
+                  <a:outerShdw blurRad="38100" dist="19050" dir="2700000" algn="tl" rotWithShape="0">
+                    <a:schemeClr val="dk1">
+                      <a:alpha val="40000"/>
+                    </a:schemeClr>
+                  </a:outerShdw>
+                </a:effectLst>
+                <a:latin typeface="Poor Richard" panose="02080502050505020702" pitchFamily="18" charset="0"/>
+              </a:rPr>
+              <a:t>github.com/&lt;user-name&gt;/&lt;repo-name&gt;/compare/&lt;commit1 Address&gt;…&lt;commit2Address&gt;</a:t>
+            </a:r>
+            <a:endParaRPr lang="en-US" sz="3200" dirty="0">
+              <a:ln w="0"/>
+              <a:solidFill>
+                <a:schemeClr val="tx1"/>
+              </a:solidFill>
+              <a:effectLst>
+                <a:outerShdw blurRad="38100" dist="19050" dir="2700000" algn="tl" rotWithShape="0">
+                  <a:schemeClr val="dk1">
+                    <a:alpha val="40000"/>
+                  </a:schemeClr>
+                </a:outerShdw>
+              </a:effectLst>
+              <a:latin typeface="Poor Richard" panose="02080502050505020702" pitchFamily="18" charset="0"/>
+            </a:endParaRPr>
+          </a:p>
+          <a:p>
+            <a:pPr algn="just"/>
+            <a:endParaRPr lang="en-US" sz="2000" dirty="0">
+              <a:ln w="0"/>
+              <a:solidFill>
+                <a:schemeClr val="tx1"/>
+              </a:solidFill>
+              <a:effectLst>
+                <a:outerShdw blurRad="38100" dist="19050" dir="2700000" algn="tl" rotWithShape="0">
+                  <a:schemeClr val="dk1">
+                    <a:alpha val="40000"/>
+                  </a:schemeClr>
+                </a:outerShdw>
+              </a:effectLst>
+              <a:latin typeface="Poor Richard" panose="02080502050505020702" pitchFamily="18" charset="0"/>
+            </a:endParaRPr>
+          </a:p>
+        </p:txBody>
+      </p:sp>
+    </p:spTree>
+    <p:extLst>
+      <p:ext uri="{BB962C8B-B14F-4D97-AF65-F5344CB8AC3E}">
         <p14:creationId xmlns:p14="http://schemas.microsoft.com/office/powerpoint/2010/main" val="2562923860"/>
+      </p:ext>
+    </p:extLst>
+  </p:cSld>
+  <p:clrMapOvr>
+    <a:masterClrMapping/>
+  </p:clrMapOvr>
+</p:sld>
+</file>
+
+<file path=ppt/slides/slide8.xml><?xml version="1.0" encoding="utf-8"?>
+<p:sld xmlns:a="http://schemas.openxmlformats.org/drawingml/2006/main" xmlns:r="http://schemas.openxmlformats.org/officeDocument/2006/relationships" xmlns:p="http://schemas.openxmlformats.org/presentationml/2006/main">
+  <p:cSld>
+    <p:spTree>
+      <p:nvGrpSpPr>
+        <p:cNvPr id="1" name=""/>
+        <p:cNvGrpSpPr/>
+        <p:nvPr/>
+      </p:nvGrpSpPr>
+      <p:grpSpPr>
+        <a:xfrm>
+          <a:off x="0" y="0"/>
+          <a:ext cx="0" cy="0"/>
+          <a:chOff x="0" y="0"/>
+          <a:chExt cx="0" cy="0"/>
+        </a:xfrm>
+      </p:grpSpPr>
+      <p:sp>
+        <p:nvSpPr>
+          <p:cNvPr id="2" name="Rectangle: Rounded Corners 1">
+            <a:extLst>
+              <a:ext uri="{FF2B5EF4-FFF2-40B4-BE49-F238E27FC236}">
+                <a16:creationId xmlns:a16="http://schemas.microsoft.com/office/drawing/2014/main" id="{FF047C5A-CC8D-4C02-8907-80366B8D93CD}"/>
+              </a:ext>
+            </a:extLst>
+          </p:cNvPr>
+          <p:cNvSpPr/>
+          <p:nvPr/>
+        </p:nvSpPr>
+        <p:spPr>
+          <a:xfrm>
+            <a:off x="-1" y="0"/>
+            <a:ext cx="6570483" cy="1033669"/>
+          </a:xfrm>
+          <a:prstGeom prst="roundRect">
+            <a:avLst/>
+          </a:prstGeom>
+          <a:solidFill>
+            <a:schemeClr val="accent3">
+              <a:alpha val="50000"/>
+            </a:schemeClr>
+          </a:solidFill>
+          <a:ln>
+            <a:noFill/>
+          </a:ln>
+        </p:spPr>
+        <p:style>
+          <a:lnRef idx="0">
+            <a:scrgbClr r="0" g="0" b="0"/>
+          </a:lnRef>
+          <a:fillRef idx="0">
+            <a:scrgbClr r="0" g="0" b="0"/>
+          </a:fillRef>
+          <a:effectRef idx="0">
+            <a:scrgbClr r="0" g="0" b="0"/>
+          </a:effectRef>
+          <a:fontRef idx="minor">
+            <a:schemeClr val="lt1"/>
+          </a:fontRef>
+        </p:style>
+        <p:txBody>
+          <a:bodyPr rtlCol="0" anchor="ctr"/>
+          <a:lstStyle/>
+          <a:p>
+            <a:pPr algn="ctr"/>
+            <a:r>
+              <a:rPr lang="en-US" sz="3600" dirty="0">
+                <a:ln w="0"/>
+                <a:solidFill>
+                  <a:srgbClr val="FFFF00"/>
+                </a:solidFill>
+                <a:effectLst>
+                  <a:outerShdw blurRad="38100" dist="19050" dir="2700000" algn="tl" rotWithShape="0">
+                    <a:schemeClr val="dk1">
+                      <a:alpha val="40000"/>
+                    </a:schemeClr>
+                  </a:outerShdw>
+                </a:effectLst>
+                <a:latin typeface="Poor Richard" panose="02080502050505020702" pitchFamily="18" charset="0"/>
+              </a:rPr>
+              <a:t>Links</a:t>
+            </a:r>
+          </a:p>
+        </p:txBody>
+      </p:sp>
+      <p:sp>
+        <p:nvSpPr>
+          <p:cNvPr id="3" name="Rectangle: Rounded Corners 2">
+            <a:extLst>
+              <a:ext uri="{FF2B5EF4-FFF2-40B4-BE49-F238E27FC236}">
+                <a16:creationId xmlns:a16="http://schemas.microsoft.com/office/drawing/2014/main" id="{EA2FC01D-16C5-48D7-8B7C-B82949EA46C4}"/>
+              </a:ext>
+            </a:extLst>
+          </p:cNvPr>
+          <p:cNvSpPr/>
+          <p:nvPr/>
+        </p:nvSpPr>
+        <p:spPr>
+          <a:xfrm>
+            <a:off x="0" y="1033669"/>
+            <a:ext cx="12192000" cy="5824332"/>
+          </a:xfrm>
+          <a:prstGeom prst="roundRect">
+            <a:avLst>
+              <a:gd name="adj" fmla="val 15461"/>
+            </a:avLst>
+          </a:prstGeom>
+          <a:noFill/>
+          <a:ln>
+            <a:noFill/>
+          </a:ln>
+        </p:spPr>
+        <p:style>
+          <a:lnRef idx="0">
+            <a:scrgbClr r="0" g="0" b="0"/>
+          </a:lnRef>
+          <a:fillRef idx="0">
+            <a:scrgbClr r="0" g="0" b="0"/>
+          </a:fillRef>
+          <a:effectRef idx="0">
+            <a:scrgbClr r="0" g="0" b="0"/>
+          </a:effectRef>
+          <a:fontRef idx="minor">
+            <a:schemeClr val="accent5"/>
+          </a:fontRef>
+        </p:style>
+        <p:txBody>
+          <a:bodyPr rtlCol="0" anchor="ctr"/>
+          <a:lstStyle/>
+          <a:p>
+            <a:pPr marL="457200" indent="-457200" algn="just">
+              <a:buFont typeface="Arial" panose="020B0604020202020204" pitchFamily="34" charset="0"/>
+              <a:buChar char="•"/>
+            </a:pPr>
+            <a:r>
+              <a:rPr lang="en-US" sz="3200" dirty="0">
+                <a:ln w="0"/>
+                <a:solidFill>
+                  <a:schemeClr val="tx1"/>
+                </a:solidFill>
+                <a:effectLst>
+                  <a:outerShdw blurRad="38100" dist="19050" dir="2700000" algn="tl" rotWithShape="0">
+                    <a:schemeClr val="dk1">
+                      <a:alpha val="40000"/>
+                    </a:schemeClr>
+                  </a:outerShdw>
+                </a:effectLst>
+                <a:latin typeface="Poor Richard" panose="02080502050505020702" pitchFamily="18" charset="0"/>
+                <a:hlinkClick r:id="rId2"/>
+              </a:rPr>
+              <a:t>Atlassian Tutorial</a:t>
+            </a:r>
+            <a:endParaRPr lang="en-US" sz="3200" dirty="0">
+              <a:ln w="0"/>
+              <a:solidFill>
+                <a:schemeClr val="tx1"/>
+              </a:solidFill>
+              <a:effectLst>
+                <a:outerShdw blurRad="38100" dist="19050" dir="2700000" algn="tl" rotWithShape="0">
+                  <a:schemeClr val="dk1">
+                    <a:alpha val="40000"/>
+                  </a:schemeClr>
+                </a:outerShdw>
+              </a:effectLst>
+              <a:latin typeface="Poor Richard" panose="02080502050505020702" pitchFamily="18" charset="0"/>
+            </a:endParaRPr>
+          </a:p>
+          <a:p>
+            <a:pPr marL="457200" indent="-457200" algn="just">
+              <a:buFont typeface="Arial" panose="020B0604020202020204" pitchFamily="34" charset="0"/>
+              <a:buChar char="•"/>
+            </a:pPr>
+            <a:r>
+              <a:rPr lang="en-US" sz="3200" dirty="0">
+                <a:ln w="0"/>
+                <a:solidFill>
+                  <a:schemeClr val="tx1"/>
+                </a:solidFill>
+                <a:effectLst>
+                  <a:outerShdw blurRad="38100" dist="19050" dir="2700000" algn="tl" rotWithShape="0">
+                    <a:schemeClr val="dk1">
+                      <a:alpha val="40000"/>
+                    </a:schemeClr>
+                  </a:outerShdw>
+                </a:effectLst>
+                <a:latin typeface="Poor Richard" panose="02080502050505020702" pitchFamily="18" charset="0"/>
+                <a:hlinkClick r:id="rId3"/>
+              </a:rPr>
+              <a:t>GitHub Docs</a:t>
+            </a:r>
+            <a:endParaRPr lang="en-US" sz="3200" dirty="0">
+              <a:ln w="0"/>
+              <a:solidFill>
+                <a:schemeClr val="tx1"/>
+              </a:solidFill>
+              <a:effectLst>
+                <a:outerShdw blurRad="38100" dist="19050" dir="2700000" algn="tl" rotWithShape="0">
+                  <a:schemeClr val="dk1">
+                    <a:alpha val="40000"/>
+                  </a:schemeClr>
+                </a:outerShdw>
+              </a:effectLst>
+              <a:latin typeface="Poor Richard" panose="02080502050505020702" pitchFamily="18" charset="0"/>
+            </a:endParaRPr>
+          </a:p>
+          <a:p>
+            <a:pPr algn="just"/>
+            <a:endParaRPr lang="en-US" sz="2000" dirty="0">
+              <a:ln w="0"/>
+              <a:solidFill>
+                <a:schemeClr val="tx1"/>
+              </a:solidFill>
+              <a:effectLst>
+                <a:outerShdw blurRad="38100" dist="19050" dir="2700000" algn="tl" rotWithShape="0">
+                  <a:schemeClr val="dk1">
+                    <a:alpha val="40000"/>
+                  </a:schemeClr>
+                </a:outerShdw>
+              </a:effectLst>
+              <a:latin typeface="Poor Richard" panose="02080502050505020702" pitchFamily="18" charset="0"/>
+            </a:endParaRPr>
+          </a:p>
+        </p:txBody>
+      </p:sp>
+    </p:spTree>
+    <p:extLst>
+      <p:ext uri="{BB962C8B-B14F-4D97-AF65-F5344CB8AC3E}">
+        <p14:creationId xmlns:p14="http://schemas.microsoft.com/office/powerpoint/2010/main" val="660555378"/>
+      </p:ext>
+    </p:extLst>
+  </p:cSld>
+  <p:clrMapOvr>
+    <a:masterClrMapping/>
+  </p:clrMapOvr>
+</p:sld>
+</file>
+
+<file path=ppt/slides/slide9.xml><?xml version="1.0" encoding="utf-8"?>
+<p:sld xmlns:a="http://schemas.openxmlformats.org/drawingml/2006/main" xmlns:r="http://schemas.openxmlformats.org/officeDocument/2006/relationships" xmlns:p="http://schemas.openxmlformats.org/presentationml/2006/main">
+  <p:cSld>
+    <p:spTree>
+      <p:nvGrpSpPr>
+        <p:cNvPr id="1" name=""/>
+        <p:cNvGrpSpPr/>
+        <p:nvPr/>
+      </p:nvGrpSpPr>
+      <p:grpSpPr>
+        <a:xfrm>
+          <a:off x="0" y="0"/>
+          <a:ext cx="0" cy="0"/>
+          <a:chOff x="0" y="0"/>
+          <a:chExt cx="0" cy="0"/>
+        </a:xfrm>
+      </p:grpSpPr>
+      <p:sp>
+        <p:nvSpPr>
+          <p:cNvPr id="2" name="Rectangle: Rounded Corners 1">
+            <a:extLst>
+              <a:ext uri="{FF2B5EF4-FFF2-40B4-BE49-F238E27FC236}">
+                <a16:creationId xmlns:a16="http://schemas.microsoft.com/office/drawing/2014/main" id="{9EC094C6-305A-49C7-B55B-1C8B6C1E3B30}"/>
+              </a:ext>
+            </a:extLst>
+          </p:cNvPr>
+          <p:cNvSpPr/>
+          <p:nvPr/>
+        </p:nvSpPr>
+        <p:spPr>
+          <a:xfrm>
+            <a:off x="0" y="516834"/>
+            <a:ext cx="12192000" cy="5824332"/>
+          </a:xfrm>
+          <a:prstGeom prst="roundRect">
+            <a:avLst>
+              <a:gd name="adj" fmla="val 15461"/>
+            </a:avLst>
+          </a:prstGeom>
+          <a:noFill/>
+          <a:ln>
+            <a:noFill/>
+          </a:ln>
+        </p:spPr>
+        <p:style>
+          <a:lnRef idx="0">
+            <a:scrgbClr r="0" g="0" b="0"/>
+          </a:lnRef>
+          <a:fillRef idx="0">
+            <a:scrgbClr r="0" g="0" b="0"/>
+          </a:fillRef>
+          <a:effectRef idx="0">
+            <a:scrgbClr r="0" g="0" b="0"/>
+          </a:effectRef>
+          <a:fontRef idx="minor">
+            <a:schemeClr val="accent5"/>
+          </a:fontRef>
+        </p:style>
+        <p:txBody>
+          <a:bodyPr rtlCol="0" anchor="ctr"/>
+          <a:lstStyle/>
+          <a:p>
+            <a:pPr algn="ctr"/>
+            <a:r>
+              <a:rPr lang="en-US" sz="16600" dirty="0">
+                <a:ln w="0"/>
+                <a:solidFill>
+                  <a:schemeClr val="tx1"/>
+                </a:solidFill>
+                <a:effectLst>
+                  <a:outerShdw blurRad="38100" dist="19050" dir="2700000" algn="tl" rotWithShape="0">
+                    <a:schemeClr val="dk1">
+                      <a:alpha val="40000"/>
+                    </a:schemeClr>
+                  </a:outerShdw>
+                </a:effectLst>
+                <a:latin typeface="Poor Richard" panose="02080502050505020702" pitchFamily="18" charset="0"/>
+              </a:rPr>
+              <a:t>End…</a:t>
+            </a:r>
+            <a:endParaRPr lang="en-US" sz="34400" dirty="0">
+              <a:ln w="0"/>
+              <a:solidFill>
+                <a:schemeClr val="tx1"/>
+              </a:solidFill>
+              <a:effectLst>
+                <a:outerShdw blurRad="38100" dist="19050" dir="2700000" algn="tl" rotWithShape="0">
+                  <a:schemeClr val="dk1">
+                    <a:alpha val="40000"/>
+                  </a:schemeClr>
+                </a:outerShdw>
+              </a:effectLst>
+              <a:latin typeface="Poor Richard" panose="02080502050505020702" pitchFamily="18" charset="0"/>
+            </a:endParaRPr>
+          </a:p>
+        </p:txBody>
+      </p:sp>
+    </p:spTree>
+    <p:extLst>
+      <p:ext uri="{BB962C8B-B14F-4D97-AF65-F5344CB8AC3E}">
+        <p14:creationId xmlns:p14="http://schemas.microsoft.com/office/powerpoint/2010/main" val="2317743518"/>
       </p:ext>
     </p:extLst>
   </p:cSld>
@@ -7563,6 +10982,23 @@
 </file>
 
 <file path=customXml/item1.xml><?xml version="1.0" encoding="utf-8"?>
+<?mso-contentType ?>
+<FormTemplates xmlns="http://schemas.microsoft.com/sharepoint/v3/contenttype/forms">
+  <Display>DocumentLibraryForm</Display>
+  <Edit>DocumentLibraryForm</Edit>
+  <New>DocumentLibraryForm</New>
+</FormTemplates>
+</file>
+
+<file path=customXml/item2.xml><?xml version="1.0" encoding="utf-8"?>
+<p:properties xmlns:p="http://schemas.microsoft.com/office/2006/metadata/properties" xmlns:xsi="http://www.w3.org/2001/XMLSchema-instance" xmlns:pc="http://schemas.microsoft.com/office/infopath/2007/PartnerControls">
+  <documentManagement>
+    <MediaServiceKeyPoints xmlns="71af3243-3dd4-4a8d-8c0d-dd76da1f02a5" xsi:nil="true"/>
+  </documentManagement>
+</p:properties>
+</file>
+
+<file path=customXml/item3.xml><?xml version="1.0" encoding="utf-8"?>
 <ct:contentTypeSchema xmlns:ct="http://schemas.microsoft.com/office/2006/metadata/contentType" xmlns:ma="http://schemas.microsoft.com/office/2006/metadata/properties/metaAttributes" ct:_="" ma:_="" ma:contentTypeName="Document" ma:contentTypeID="0x01010079F111ED35F8CC479449609E8A0923A6" ma:contentTypeVersion="11" ma:contentTypeDescription="Create a new document." ma:contentTypeScope="" ma:versionID="9677210f24a1be23c92c90fd886aa0aa">
   <xsd:schema xmlns:xsd="http://www.w3.org/2001/XMLSchema" xmlns:xs="http://www.w3.org/2001/XMLSchema" xmlns:p="http://schemas.microsoft.com/office/2006/metadata/properties" xmlns:ns2="71af3243-3dd4-4a8d-8c0d-dd76da1f02a5" xmlns:ns3="16c05727-aa75-4e4a-9b5f-8a80a1165891" targetNamespace="http://schemas.microsoft.com/office/2006/metadata/properties" ma:root="true" ma:fieldsID="60e05723c5c1908df1a1a4ebf11d344e" ns2:_="" ns3:_="">
     <xsd:import namespace="71af3243-3dd4-4a8d-8c0d-dd76da1f02a5"/>
@@ -7773,24 +11209,25 @@
 </ct:contentTypeSchema>
 </file>
 
-<file path=customXml/item2.xml><?xml version="1.0" encoding="utf-8"?>
-<p:properties xmlns:p="http://schemas.microsoft.com/office/2006/metadata/properties" xmlns:xsi="http://www.w3.org/2001/XMLSchema-instance" xmlns:pc="http://schemas.microsoft.com/office/infopath/2007/PartnerControls">
-  <documentManagement>
-    <MediaServiceKeyPoints xmlns="71af3243-3dd4-4a8d-8c0d-dd76da1f02a5" xsi:nil="true"/>
-  </documentManagement>
-</p:properties>
+<file path=customXml/itemProps1.xml><?xml version="1.0" encoding="utf-8"?>
+<ds:datastoreItem xmlns:ds="http://schemas.openxmlformats.org/officeDocument/2006/customXml" ds:itemID="{FE57094B-4684-420B-AFE0-4E41CA2AF714}">
+  <ds:schemaRefs>
+    <ds:schemaRef ds:uri="http://schemas.microsoft.com/sharepoint/v3/contenttype/forms"/>
+  </ds:schemaRefs>
+</ds:datastoreItem>
 </file>
 
-<file path=customXml/item3.xml><?xml version="1.0" encoding="utf-8"?>
-<?mso-contentType ?>
-<FormTemplates xmlns="http://schemas.microsoft.com/sharepoint/v3/contenttype/forms">
-  <Display>DocumentLibraryForm</Display>
-  <Edit>DocumentLibraryForm</Edit>
-  <New>DocumentLibraryForm</New>
-</FormTemplates>
+<file path=customXml/itemProps2.xml><?xml version="1.0" encoding="utf-8"?>
+<ds:datastoreItem xmlns:ds="http://schemas.openxmlformats.org/officeDocument/2006/customXml" ds:itemID="{B26D5668-1971-40BB-BC7C-94C9B101AAB7}">
+  <ds:schemaRefs>
+    <ds:schemaRef ds:uri="http://schemas.microsoft.com/office/2006/metadata/properties"/>
+    <ds:schemaRef ds:uri="http://schemas.microsoft.com/office/infopath/2007/PartnerControls"/>
+    <ds:schemaRef ds:uri="71af3243-3dd4-4a8d-8c0d-dd76da1f02a5"/>
+  </ds:schemaRefs>
+</ds:datastoreItem>
 </file>
 
-<file path=customXml/itemProps1.xml><?xml version="1.0" encoding="utf-8"?>
+<file path=customXml/itemProps3.xml><?xml version="1.0" encoding="utf-8"?>
 <ds:datastoreItem xmlns:ds="http://schemas.openxmlformats.org/officeDocument/2006/customXml" ds:itemID="{3370F4A1-FC59-4361-989F-6C79533DA565}">
   <ds:schemaRefs>
     <ds:schemaRef ds:uri="http://schemas.microsoft.com/office/2006/metadata/contentType"/>
@@ -7807,22 +11244,4 @@
     <ds:schemaRef ds:uri="http://schemas.microsoft.com/internal/obd"/>
   </ds:schemaRefs>
 </ds:datastoreItem>
-</file>
-
-<file path=customXml/itemProps2.xml><?xml version="1.0" encoding="utf-8"?>
-<ds:datastoreItem xmlns:ds="http://schemas.openxmlformats.org/officeDocument/2006/customXml" ds:itemID="{B26D5668-1971-40BB-BC7C-94C9B101AAB7}">
-  <ds:schemaRefs>
-    <ds:schemaRef ds:uri="http://schemas.microsoft.com/office/2006/metadata/properties"/>
-    <ds:schemaRef ds:uri="http://schemas.microsoft.com/office/infopath/2007/PartnerControls"/>
-    <ds:schemaRef ds:uri="71af3243-3dd4-4a8d-8c0d-dd76da1f02a5"/>
-  </ds:schemaRefs>
-</ds:datastoreItem>
-</file>
-
-<file path=customXml/itemProps3.xml><?xml version="1.0" encoding="utf-8"?>
-<ds:datastoreItem xmlns:ds="http://schemas.openxmlformats.org/officeDocument/2006/customXml" ds:itemID="{FE57094B-4684-420B-AFE0-4E41CA2AF714}">
-  <ds:schemaRefs>
-    <ds:schemaRef ds:uri="http://schemas.microsoft.com/sharepoint/v3/contenttype/forms"/>
-  </ds:schemaRefs>
-</ds:datastoreItem>
 </file>
</xml_diff>

<commit_message>
adding dart learning files.
</commit_message>
<xml_diff>
--- a/learn_git/Learning_git.pptx
+++ b/learn_git/Learning_git.pptx
@@ -10991,14 +10991,6 @@
 </file>
 
 <file path=customXml/item2.xml><?xml version="1.0" encoding="utf-8"?>
-<p:properties xmlns:p="http://schemas.microsoft.com/office/2006/metadata/properties" xmlns:xsi="http://www.w3.org/2001/XMLSchema-instance" xmlns:pc="http://schemas.microsoft.com/office/infopath/2007/PartnerControls">
-  <documentManagement>
-    <MediaServiceKeyPoints xmlns="71af3243-3dd4-4a8d-8c0d-dd76da1f02a5" xsi:nil="true"/>
-  </documentManagement>
-</p:properties>
-</file>
-
-<file path=customXml/item3.xml><?xml version="1.0" encoding="utf-8"?>
 <ct:contentTypeSchema xmlns:ct="http://schemas.microsoft.com/office/2006/metadata/contentType" xmlns:ma="http://schemas.microsoft.com/office/2006/metadata/properties/metaAttributes" ct:_="" ma:_="" ma:contentTypeName="Document" ma:contentTypeID="0x01010079F111ED35F8CC479449609E8A0923A6" ma:contentTypeVersion="11" ma:contentTypeDescription="Create a new document." ma:contentTypeScope="" ma:versionID="9677210f24a1be23c92c90fd886aa0aa">
   <xsd:schema xmlns:xsd="http://www.w3.org/2001/XMLSchema" xmlns:xs="http://www.w3.org/2001/XMLSchema" xmlns:p="http://schemas.microsoft.com/office/2006/metadata/properties" xmlns:ns2="71af3243-3dd4-4a8d-8c0d-dd76da1f02a5" xmlns:ns3="16c05727-aa75-4e4a-9b5f-8a80a1165891" targetNamespace="http://schemas.microsoft.com/office/2006/metadata/properties" ma:root="true" ma:fieldsID="60e05723c5c1908df1a1a4ebf11d344e" ns2:_="" ns3:_="">
     <xsd:import namespace="71af3243-3dd4-4a8d-8c0d-dd76da1f02a5"/>
@@ -11209,6 +11201,14 @@
 </ct:contentTypeSchema>
 </file>
 
+<file path=customXml/item3.xml><?xml version="1.0" encoding="utf-8"?>
+<p:properties xmlns:p="http://schemas.microsoft.com/office/2006/metadata/properties" xmlns:xsi="http://www.w3.org/2001/XMLSchema-instance" xmlns:pc="http://schemas.microsoft.com/office/infopath/2007/PartnerControls">
+  <documentManagement>
+    <MediaServiceKeyPoints xmlns="71af3243-3dd4-4a8d-8c0d-dd76da1f02a5" xsi:nil="true"/>
+  </documentManagement>
+</p:properties>
+</file>
+
 <file path=customXml/itemProps1.xml><?xml version="1.0" encoding="utf-8"?>
 <ds:datastoreItem xmlns:ds="http://schemas.openxmlformats.org/officeDocument/2006/customXml" ds:itemID="{FE57094B-4684-420B-AFE0-4E41CA2AF714}">
   <ds:schemaRefs>
@@ -11218,16 +11218,6 @@
 </file>
 
 <file path=customXml/itemProps2.xml><?xml version="1.0" encoding="utf-8"?>
-<ds:datastoreItem xmlns:ds="http://schemas.openxmlformats.org/officeDocument/2006/customXml" ds:itemID="{B26D5668-1971-40BB-BC7C-94C9B101AAB7}">
-  <ds:schemaRefs>
-    <ds:schemaRef ds:uri="http://schemas.microsoft.com/office/2006/metadata/properties"/>
-    <ds:schemaRef ds:uri="http://schemas.microsoft.com/office/infopath/2007/PartnerControls"/>
-    <ds:schemaRef ds:uri="71af3243-3dd4-4a8d-8c0d-dd76da1f02a5"/>
-  </ds:schemaRefs>
-</ds:datastoreItem>
-</file>
-
-<file path=customXml/itemProps3.xml><?xml version="1.0" encoding="utf-8"?>
 <ds:datastoreItem xmlns:ds="http://schemas.openxmlformats.org/officeDocument/2006/customXml" ds:itemID="{3370F4A1-FC59-4361-989F-6C79533DA565}">
   <ds:schemaRefs>
     <ds:schemaRef ds:uri="http://schemas.microsoft.com/office/2006/metadata/contentType"/>
@@ -11244,4 +11234,14 @@
     <ds:schemaRef ds:uri="http://schemas.microsoft.com/internal/obd"/>
   </ds:schemaRefs>
 </ds:datastoreItem>
+</file>
+
+<file path=customXml/itemProps3.xml><?xml version="1.0" encoding="utf-8"?>
+<ds:datastoreItem xmlns:ds="http://schemas.openxmlformats.org/officeDocument/2006/customXml" ds:itemID="{B26D5668-1971-40BB-BC7C-94C9B101AAB7}">
+  <ds:schemaRefs>
+    <ds:schemaRef ds:uri="http://schemas.microsoft.com/office/2006/metadata/properties"/>
+    <ds:schemaRef ds:uri="http://schemas.microsoft.com/office/infopath/2007/PartnerControls"/>
+    <ds:schemaRef ds:uri="71af3243-3dd4-4a8d-8c0d-dd76da1f02a5"/>
+  </ds:schemaRefs>
+</ds:datastoreItem>
 </file>
</xml_diff>